<commit_message>
Updating figures and docs
- Docs updated from .png raster graphics to .svg vector graphics when applicable
- Added graphics for CommsFlow and MultiFlow
- Fixed Marp setup for Into_to_fmdtools--now produces images in pdf as desired
- Added missing figures per RAD-461
- Resolves: RAD-461
</commit_message>
<xml_diff>
--- a/docs-source/figures/powerpoint/powerpoint_figures.pptx
+++ b/docs-source/figures/powerpoint/powerpoint_figures.pptx
@@ -212,7 +212,7 @@
           <a:p>
             <a:fld id="{711A52A6-9D8E-41FC-9651-78B3E515F872}" type="datetimeFigureOut">
               <a:rPr lang="en-US" smtClean="0"/>
-              <a:t>5/16/2024</a:t>
+              <a:t>12/11/2024</a:t>
             </a:fld>
             <a:endParaRPr lang="en-US"/>
           </a:p>
@@ -639,7 +639,7 @@
           <a:p>
             <a:fld id="{77F775AD-3704-4F98-A581-F4E052B5E341}" type="datetime1">
               <a:rPr lang="en-US" smtClean="0"/>
-              <a:t>5/16/2024</a:t>
+              <a:t>12/11/2024</a:t>
             </a:fld>
             <a:endParaRPr lang="en-US" dirty="0"/>
           </a:p>
@@ -888,7 +888,7 @@
           <a:p>
             <a:fld id="{B49B97F0-8049-4B63-9B9F-B08800B08AEA}" type="datetime1">
               <a:rPr lang="en-US" smtClean="0"/>
-              <a:t>5/16/2024</a:t>
+              <a:t>12/11/2024</a:t>
             </a:fld>
             <a:endParaRPr lang="en-US"/>
           </a:p>
@@ -1128,7 +1128,7 @@
           <a:p>
             <a:fld id="{76BB3555-78C2-4894-951A-9F28C24107FA}" type="datetime1">
               <a:rPr lang="en-US" smtClean="0"/>
-              <a:t>5/16/2024</a:t>
+              <a:t>12/11/2024</a:t>
             </a:fld>
             <a:endParaRPr lang="en-US"/>
           </a:p>
@@ -1358,7 +1358,7 @@
           <a:p>
             <a:fld id="{37A4B9B3-CD86-4259-A27A-F9B9C6081119}" type="datetime1">
               <a:rPr lang="en-US" smtClean="0"/>
-              <a:t>5/16/2024</a:t>
+              <a:t>12/11/2024</a:t>
             </a:fld>
             <a:endParaRPr lang="en-US"/>
           </a:p>
@@ -1636,7 +1636,7 @@
           <a:p>
             <a:fld id="{66287512-E62E-4968-99B9-D028D358C1D6}" type="datetime1">
               <a:rPr lang="en-US" smtClean="0"/>
-              <a:t>5/16/2024</a:t>
+              <a:t>12/11/2024</a:t>
             </a:fld>
             <a:endParaRPr lang="en-US"/>
           </a:p>
@@ -1959,7 +1959,7 @@
           <a:p>
             <a:fld id="{356AD7E7-9EE9-4D28-82A7-0AE338FFEED9}" type="datetime1">
               <a:rPr lang="en-US" smtClean="0"/>
-              <a:t>5/16/2024</a:t>
+              <a:t>12/11/2024</a:t>
             </a:fld>
             <a:endParaRPr lang="en-US"/>
           </a:p>
@@ -2433,7 +2433,7 @@
           <a:p>
             <a:fld id="{0B5CD5E0-6150-412F-8881-52709F06EC3B}" type="datetime1">
               <a:rPr lang="en-US" smtClean="0"/>
-              <a:t>5/16/2024</a:t>
+              <a:t>12/11/2024</a:t>
             </a:fld>
             <a:endParaRPr lang="en-US"/>
           </a:p>
@@ -2580,7 +2580,7 @@
           <a:p>
             <a:fld id="{9428AFA3-5281-4B53-8B8B-8FD665A2F0D7}" type="datetime1">
               <a:rPr lang="en-US" smtClean="0"/>
-              <a:t>5/16/2024</a:t>
+              <a:t>12/11/2024</a:t>
             </a:fld>
             <a:endParaRPr lang="en-US"/>
           </a:p>
@@ -2693,7 +2693,7 @@
           <a:p>
             <a:fld id="{556D1394-26AC-45DA-9E25-AB3CC25C7422}" type="datetime1">
               <a:rPr lang="en-US" smtClean="0"/>
-              <a:t>5/16/2024</a:t>
+              <a:t>12/11/2024</a:t>
             </a:fld>
             <a:endParaRPr lang="en-US"/>
           </a:p>
@@ -3018,7 +3018,7 @@
           <a:p>
             <a:fld id="{B641D803-18D9-4B72-95D8-021B736F630F}" type="datetime1">
               <a:rPr lang="en-US" smtClean="0"/>
-              <a:t>5/16/2024</a:t>
+              <a:t>12/11/2024</a:t>
             </a:fld>
             <a:endParaRPr lang="en-US"/>
           </a:p>
@@ -3310,7 +3310,7 @@
           <a:p>
             <a:fld id="{9F82DFCB-4787-4629-B4F0-DCD676BE203A}" type="datetime1">
               <a:rPr lang="en-US" smtClean="0"/>
-              <a:t>5/16/2024</a:t>
+              <a:t>12/11/2024</a:t>
             </a:fld>
             <a:endParaRPr lang="en-US"/>
           </a:p>
@@ -3550,7 +3550,7 @@
           <a:p>
             <a:fld id="{300C2ECC-D91C-40D5-A01C-469FC90F0645}" type="datetime1">
               <a:rPr lang="en-US" smtClean="0"/>
-              <a:t>5/16/2024</a:t>
+              <a:t>12/11/2024</a:t>
             </a:fld>
             <a:endParaRPr lang="en-US" dirty="0"/>
           </a:p>
@@ -6395,8 +6395,8 @@
         </p:nvSpPr>
         <p:spPr>
           <a:xfrm>
-            <a:off x="9112767" y="1525889"/>
-            <a:ext cx="2808905" cy="3553187"/>
+            <a:off x="8716097" y="1525889"/>
+            <a:ext cx="3475903" cy="5145772"/>
           </a:xfrm>
           <a:prstGeom prst="flowChartProcess">
             <a:avLst/>
@@ -6440,7 +6440,7 @@
                   <a:schemeClr val="tx1"/>
                 </a:solidFill>
               </a:rPr>
-              <a:t>graph.py</a:t>
+              <a:t>/graph</a:t>
             </a:r>
           </a:p>
           <a:p>
@@ -6450,111 +6450,7 @@
                   <a:schemeClr val="tx1"/>
                 </a:solidFill>
               </a:rPr>
-              <a:t>Visualization of simulation results on the model graph</a:t>
-            </a:r>
-          </a:p>
-          <a:p>
-            <a:pPr marL="285750" indent="-285750">
-              <a:buFontTx/>
-              <a:buChar char="-"/>
-            </a:pPr>
-            <a:r>
-              <a:rPr lang="en-US" sz="1600" b="1" dirty="0">
-                <a:solidFill>
-                  <a:schemeClr val="tx1"/>
-                </a:solidFill>
-              </a:rPr>
-              <a:t>Graph: </a:t>
-            </a:r>
-            <a:r>
-              <a:rPr lang="en-US" sz="1600" dirty="0">
-                <a:solidFill>
-                  <a:schemeClr val="tx1"/>
-                </a:solidFill>
-              </a:rPr>
-              <a:t>Base class for graph display methods, with methods like</a:t>
-            </a:r>
-          </a:p>
-          <a:p>
-            <a:r>
-              <a:rPr lang="en-US" sz="1600" b="1" dirty="0">
-                <a:solidFill>
-                  <a:schemeClr val="tx1"/>
-                </a:solidFill>
-              </a:rPr>
-              <a:t>-</a:t>
-            </a:r>
-            <a:r>
-              <a:rPr lang="en-US" sz="1600" b="1" dirty="0" err="1">
-                <a:solidFill>
-                  <a:schemeClr val="tx1"/>
-                </a:solidFill>
-              </a:rPr>
-              <a:t>ModelGraph</a:t>
-            </a:r>
-            <a:r>
-              <a:rPr lang="en-US" sz="1600" b="1" dirty="0">
-                <a:solidFill>
-                  <a:schemeClr val="tx1"/>
-                </a:solidFill>
-              </a:rPr>
-              <a:t>, </a:t>
-            </a:r>
-            <a:r>
-              <a:rPr lang="en-US" sz="1600" b="1" dirty="0" err="1">
-                <a:solidFill>
-                  <a:schemeClr val="tx1"/>
-                </a:solidFill>
-              </a:rPr>
-              <a:t>ASGGraph</a:t>
-            </a:r>
-            <a:r>
-              <a:rPr lang="en-US" sz="1600" b="1" dirty="0">
-                <a:solidFill>
-                  <a:schemeClr val="tx1"/>
-                </a:solidFill>
-              </a:rPr>
-              <a:t>, </a:t>
-            </a:r>
-            <a:r>
-              <a:rPr lang="en-US" sz="1600" b="1" dirty="0" err="1">
-                <a:solidFill>
-                  <a:schemeClr val="tx1"/>
-                </a:solidFill>
-              </a:rPr>
-              <a:t>etc</a:t>
-            </a:r>
-            <a:r>
-              <a:rPr lang="en-US" sz="1600" b="1" dirty="0">
-                <a:solidFill>
-                  <a:schemeClr val="tx1"/>
-                </a:solidFill>
-              </a:rPr>
-              <a:t>: </a:t>
-            </a:r>
-            <a:r>
-              <a:rPr lang="en-US" sz="1600" dirty="0">
-                <a:solidFill>
-                  <a:schemeClr val="tx1"/>
-                </a:solidFill>
-              </a:rPr>
-              <a:t>Subclasses that create graph structures for specific </a:t>
-            </a:r>
-            <a:r>
-              <a:rPr lang="en-US" sz="1600" dirty="0" err="1">
-                <a:solidFill>
-                  <a:schemeClr val="tx1"/>
-                </a:solidFill>
-              </a:rPr>
-              <a:t>fmdtools</a:t>
-            </a:r>
-            <a:r>
-              <a:rPr lang="en-US" sz="1600" dirty="0">
-                <a:solidFill>
-                  <a:schemeClr val="tx1"/>
-                </a:solidFill>
-              </a:rPr>
-              <a:t> classes</a:t>
+              <a:t>Graph-based visualizations.</a:t>
             </a:r>
           </a:p>
           <a:p>
@@ -6587,7 +6483,7 @@
         </p:nvSpPr>
         <p:spPr>
           <a:xfrm>
-            <a:off x="112014" y="1525890"/>
+            <a:off x="8651" y="1525890"/>
             <a:ext cx="2972008" cy="2074025"/>
           </a:xfrm>
           <a:prstGeom prst="flowChartProcess">
@@ -6724,7 +6620,7 @@
         </p:nvSpPr>
         <p:spPr>
           <a:xfrm>
-            <a:off x="3328768" y="1525889"/>
+            <a:off x="3106132" y="1525889"/>
             <a:ext cx="2775564" cy="3935373"/>
           </a:xfrm>
           <a:prstGeom prst="flowChartProcess">
@@ -6932,7 +6828,7 @@
         </p:blipFill>
         <p:spPr bwMode="auto">
           <a:xfrm>
-            <a:off x="9682296" y="4326823"/>
+            <a:off x="10079855" y="6092619"/>
             <a:ext cx="2048671" cy="458284"/>
           </a:xfrm>
           <a:prstGeom prst="rect">
@@ -6964,8 +6860,8 @@
         </p:nvSpPr>
         <p:spPr>
           <a:xfrm>
-            <a:off x="261644" y="186340"/>
-            <a:ext cx="11777872" cy="884985"/>
+            <a:off x="1" y="186340"/>
+            <a:ext cx="12117786" cy="884985"/>
           </a:xfrm>
           <a:prstGeom prst="flowChartProcess">
             <a:avLst/>
@@ -7084,7 +6980,7 @@
         </p:nvSpPr>
         <p:spPr>
           <a:xfrm>
-            <a:off x="112014" y="4042063"/>
+            <a:off x="8651" y="4042063"/>
             <a:ext cx="2983884" cy="2074025"/>
           </a:xfrm>
           <a:prstGeom prst="flowChartProcess">
@@ -7180,7 +7076,7 @@
         </p:nvSpPr>
         <p:spPr>
           <a:xfrm>
-            <a:off x="6351496" y="1525889"/>
+            <a:off x="6021537" y="1525887"/>
             <a:ext cx="2570566" cy="2929732"/>
           </a:xfrm>
           <a:prstGeom prst="flowChartProcess">
@@ -7227,13 +7123,13 @@
               </a:rPr>
               <a:t>phases.py</a:t>
             </a:r>
-            <a:br>
-              <a:rPr lang="en-US" sz="1600" dirty="0">
-                <a:solidFill>
-                  <a:schemeClr val="tx1"/>
-                </a:solidFill>
-              </a:rPr>
-            </a:br>
+            <a:endParaRPr lang="en-US" sz="1600" dirty="0">
+              <a:solidFill>
+                <a:schemeClr val="tx1"/>
+              </a:solidFill>
+            </a:endParaRPr>
+          </a:p>
+          <a:p>
             <a:r>
               <a:rPr lang="en-US" sz="1600" dirty="0">
                 <a:solidFill>
@@ -7439,7 +7335,7 @@
         </p:nvCxnSpPr>
         <p:spPr>
           <a:xfrm flipV="1">
-            <a:off x="1598018" y="1071325"/>
+            <a:off x="1494655" y="1071325"/>
             <a:ext cx="0" cy="454565"/>
           </a:xfrm>
           <a:prstGeom prst="straightConnector1">
@@ -7484,7 +7380,7 @@
         </p:nvCxnSpPr>
         <p:spPr>
           <a:xfrm flipV="1">
-            <a:off x="4716550" y="1071324"/>
+            <a:off x="4493914" y="1071324"/>
             <a:ext cx="0" cy="454565"/>
           </a:xfrm>
           <a:prstGeom prst="straightConnector1">
@@ -7529,7 +7425,7 @@
         </p:nvCxnSpPr>
         <p:spPr>
           <a:xfrm flipV="1">
-            <a:off x="7624899" y="1071323"/>
+            <a:off x="7298896" y="1071322"/>
             <a:ext cx="0" cy="454565"/>
           </a:xfrm>
           <a:prstGeom prst="straightConnector1">
@@ -7574,7 +7470,7 @@
         </p:nvCxnSpPr>
         <p:spPr>
           <a:xfrm flipV="1">
-            <a:off x="1501036" y="3599915"/>
+            <a:off x="1397673" y="3599915"/>
             <a:ext cx="0" cy="454565"/>
           </a:xfrm>
           <a:prstGeom prst="straightConnector1">
@@ -7619,8 +7515,511 @@
         </p:nvCxnSpPr>
         <p:spPr>
           <a:xfrm flipV="1">
-            <a:off x="10497026" y="1071322"/>
+            <a:off x="10466526" y="1071322"/>
             <a:ext cx="0" cy="454565"/>
+          </a:xfrm>
+          <a:prstGeom prst="straightConnector1">
+            <a:avLst/>
+          </a:prstGeom>
+          <a:ln w="38100">
+            <a:solidFill>
+              <a:schemeClr val="accent6"/>
+            </a:solidFill>
+            <a:prstDash val="solid"/>
+            <a:tailEnd type="triangle"/>
+          </a:ln>
+        </p:spPr>
+        <p:style>
+          <a:lnRef idx="1">
+            <a:schemeClr val="accent1"/>
+          </a:lnRef>
+          <a:fillRef idx="0">
+            <a:schemeClr val="accent1"/>
+          </a:fillRef>
+          <a:effectRef idx="0">
+            <a:schemeClr val="accent1"/>
+          </a:effectRef>
+          <a:fontRef idx="minor">
+            <a:schemeClr val="tx1"/>
+          </a:fontRef>
+        </p:style>
+      </p:cxnSp>
+      <p:sp>
+        <p:nvSpPr>
+          <p:cNvPr id="6" name="Flowchart: Process 5">
+            <a:extLst>
+              <a:ext uri="{FF2B5EF4-FFF2-40B4-BE49-F238E27FC236}">
+                <a16:creationId xmlns:a16="http://schemas.microsoft.com/office/drawing/2014/main" id="{66FCDDE0-2BC9-7D13-3256-1274F9535E88}"/>
+              </a:ext>
+            </a:extLst>
+          </p:cNvPr>
+          <p:cNvSpPr/>
+          <p:nvPr/>
+        </p:nvSpPr>
+        <p:spPr>
+          <a:xfrm>
+            <a:off x="8804525" y="3392414"/>
+            <a:ext cx="3324001" cy="1139695"/>
+          </a:xfrm>
+          <a:prstGeom prst="flowChartProcess">
+            <a:avLst/>
+          </a:prstGeom>
+          <a:solidFill>
+            <a:schemeClr val="bg1"/>
+          </a:solidFill>
+          <a:ln w="38100">
+            <a:solidFill>
+              <a:schemeClr val="tx1">
+                <a:lumMod val="50000"/>
+                <a:lumOff val="50000"/>
+              </a:schemeClr>
+            </a:solidFill>
+          </a:ln>
+        </p:spPr>
+        <p:style>
+          <a:lnRef idx="2">
+            <a:schemeClr val="accent1">
+              <a:shade val="50000"/>
+            </a:schemeClr>
+          </a:lnRef>
+          <a:fillRef idx="1">
+            <a:schemeClr val="accent1"/>
+          </a:fillRef>
+          <a:effectRef idx="0">
+            <a:schemeClr val="accent1"/>
+          </a:effectRef>
+          <a:fontRef idx="minor">
+            <a:schemeClr val="lt1"/>
+          </a:fontRef>
+        </p:style>
+        <p:txBody>
+          <a:bodyPr rtlCol="0" anchor="t"/>
+          <a:lstStyle/>
+          <a:p>
+            <a:pPr algn="ctr"/>
+            <a:r>
+              <a:rPr lang="en-US" b="1" dirty="0">
+                <a:solidFill>
+                  <a:schemeClr val="tx1"/>
+                </a:solidFill>
+              </a:rPr>
+              <a:t>base.py</a:t>
+            </a:r>
+            <a:endParaRPr lang="en-US" sz="1600" dirty="0">
+              <a:solidFill>
+                <a:schemeClr val="tx1"/>
+              </a:solidFill>
+            </a:endParaRPr>
+          </a:p>
+          <a:p>
+            <a:r>
+              <a:rPr lang="en-US" sz="1600" dirty="0">
+                <a:solidFill>
+                  <a:schemeClr val="tx1"/>
+                </a:solidFill>
+              </a:rPr>
+              <a:t>Generic graph-based visualizations.</a:t>
+            </a:r>
+          </a:p>
+          <a:p>
+            <a:pPr marL="285750" indent="-285750">
+              <a:buFontTx/>
+              <a:buChar char="-"/>
+            </a:pPr>
+            <a:r>
+              <a:rPr lang="en-US" sz="1600" b="1" dirty="0">
+                <a:solidFill>
+                  <a:schemeClr val="tx1"/>
+                </a:solidFill>
+              </a:rPr>
+              <a:t>Graph: </a:t>
+            </a:r>
+            <a:r>
+              <a:rPr lang="en-US" sz="1600" dirty="0">
+                <a:solidFill>
+                  <a:schemeClr val="tx1"/>
+                </a:solidFill>
+              </a:rPr>
+              <a:t>Base class for displaying and interacting with graphs.</a:t>
+            </a:r>
+          </a:p>
+          <a:p>
+            <a:endParaRPr lang="en-US" sz="1600" dirty="0">
+              <a:solidFill>
+                <a:schemeClr val="tx1"/>
+              </a:solidFill>
+            </a:endParaRPr>
+          </a:p>
+        </p:txBody>
+      </p:sp>
+      <p:sp>
+        <p:nvSpPr>
+          <p:cNvPr id="10" name="Flowchart: Process 9">
+            <a:extLst>
+              <a:ext uri="{FF2B5EF4-FFF2-40B4-BE49-F238E27FC236}">
+                <a16:creationId xmlns:a16="http://schemas.microsoft.com/office/drawing/2014/main" id="{11836C59-11E6-FBBE-895B-14262CF2A8D7}"/>
+              </a:ext>
+            </a:extLst>
+          </p:cNvPr>
+          <p:cNvSpPr/>
+          <p:nvPr/>
+        </p:nvSpPr>
+        <p:spPr>
+          <a:xfrm>
+            <a:off x="8716097" y="2149559"/>
+            <a:ext cx="1742359" cy="800375"/>
+          </a:xfrm>
+          <a:prstGeom prst="flowChartProcess">
+            <a:avLst/>
+          </a:prstGeom>
+          <a:solidFill>
+            <a:schemeClr val="bg1"/>
+          </a:solidFill>
+          <a:ln w="38100">
+            <a:solidFill>
+              <a:schemeClr val="tx1">
+                <a:lumMod val="50000"/>
+                <a:lumOff val="50000"/>
+              </a:schemeClr>
+            </a:solidFill>
+          </a:ln>
+        </p:spPr>
+        <p:style>
+          <a:lnRef idx="2">
+            <a:schemeClr val="accent1">
+              <a:shade val="50000"/>
+            </a:schemeClr>
+          </a:lnRef>
+          <a:fillRef idx="1">
+            <a:schemeClr val="accent1"/>
+          </a:fillRef>
+          <a:effectRef idx="0">
+            <a:schemeClr val="accent1"/>
+          </a:effectRef>
+          <a:fontRef idx="minor">
+            <a:schemeClr val="lt1"/>
+          </a:fontRef>
+        </p:style>
+        <p:txBody>
+          <a:bodyPr rtlCol="0" anchor="t"/>
+          <a:lstStyle/>
+          <a:p>
+            <a:pPr algn="ctr"/>
+            <a:r>
+              <a:rPr lang="en-US" b="1" dirty="0">
+                <a:solidFill>
+                  <a:schemeClr val="tx1"/>
+                </a:solidFill>
+              </a:rPr>
+              <a:t>label.py</a:t>
+            </a:r>
+          </a:p>
+          <a:p>
+            <a:r>
+              <a:rPr lang="en-US" sz="1600" dirty="0">
+                <a:solidFill>
+                  <a:schemeClr val="tx1"/>
+                </a:solidFill>
+              </a:rPr>
+              <a:t>Defines graph labels.</a:t>
+            </a:r>
+          </a:p>
+        </p:txBody>
+      </p:sp>
+      <p:sp>
+        <p:nvSpPr>
+          <p:cNvPr id="12" name="Flowchart: Process 11">
+            <a:extLst>
+              <a:ext uri="{FF2B5EF4-FFF2-40B4-BE49-F238E27FC236}">
+                <a16:creationId xmlns:a16="http://schemas.microsoft.com/office/drawing/2014/main" id="{88279F10-B53E-23F2-92DF-C0404D68590C}"/>
+              </a:ext>
+            </a:extLst>
+          </p:cNvPr>
+          <p:cNvSpPr/>
+          <p:nvPr/>
+        </p:nvSpPr>
+        <p:spPr>
+          <a:xfrm>
+            <a:off x="8804525" y="4914191"/>
+            <a:ext cx="3324001" cy="1139695"/>
+          </a:xfrm>
+          <a:prstGeom prst="flowChartProcess">
+            <a:avLst/>
+          </a:prstGeom>
+          <a:solidFill>
+            <a:schemeClr val="bg1"/>
+          </a:solidFill>
+          <a:ln w="38100">
+            <a:solidFill>
+              <a:schemeClr val="tx1">
+                <a:lumMod val="50000"/>
+                <a:lumOff val="50000"/>
+              </a:schemeClr>
+            </a:solidFill>
+          </a:ln>
+        </p:spPr>
+        <p:style>
+          <a:lnRef idx="2">
+            <a:schemeClr val="accent1">
+              <a:shade val="50000"/>
+            </a:schemeClr>
+          </a:lnRef>
+          <a:fillRef idx="1">
+            <a:schemeClr val="accent1"/>
+          </a:fillRef>
+          <a:effectRef idx="0">
+            <a:schemeClr val="accent1"/>
+          </a:effectRef>
+          <a:fontRef idx="minor">
+            <a:schemeClr val="lt1"/>
+          </a:fontRef>
+        </p:style>
+        <p:txBody>
+          <a:bodyPr rtlCol="0" anchor="t"/>
+          <a:lstStyle/>
+          <a:p>
+            <a:pPr algn="ctr"/>
+            <a:r>
+              <a:rPr lang="en-US" b="1" dirty="0">
+                <a:solidFill>
+                  <a:schemeClr val="tx1"/>
+                </a:solidFill>
+              </a:rPr>
+              <a:t>model.py</a:t>
+            </a:r>
+          </a:p>
+          <a:p>
+            <a:r>
+              <a:rPr lang="en-US" sz="1600" dirty="0">
+                <a:solidFill>
+                  <a:schemeClr val="tx1"/>
+                </a:solidFill>
+              </a:rPr>
+              <a:t>Graph visualizations for models</a:t>
+            </a:r>
+          </a:p>
+          <a:p>
+            <a:pPr marL="285750" indent="-285750">
+              <a:buFontTx/>
+              <a:buChar char="-"/>
+            </a:pPr>
+            <a:r>
+              <a:rPr lang="en-US" sz="1600" b="1" dirty="0" err="1">
+                <a:solidFill>
+                  <a:schemeClr val="tx1"/>
+                </a:solidFill>
+              </a:rPr>
+              <a:t>ModelGraph</a:t>
+            </a:r>
+            <a:r>
+              <a:rPr lang="en-US" sz="1600" b="1" dirty="0">
+                <a:solidFill>
+                  <a:schemeClr val="tx1"/>
+                </a:solidFill>
+              </a:rPr>
+              <a:t>: </a:t>
+            </a:r>
+            <a:r>
+              <a:rPr lang="en-US" sz="1600" dirty="0">
+                <a:solidFill>
+                  <a:schemeClr val="tx1"/>
+                </a:solidFill>
+              </a:rPr>
+              <a:t>Class to represent model constructs as graphs</a:t>
+            </a:r>
+          </a:p>
+          <a:p>
+            <a:endParaRPr lang="en-US" sz="1600" dirty="0">
+              <a:solidFill>
+                <a:schemeClr val="tx1"/>
+              </a:solidFill>
+            </a:endParaRPr>
+          </a:p>
+        </p:txBody>
+      </p:sp>
+      <p:sp>
+        <p:nvSpPr>
+          <p:cNvPr id="13" name="Flowchart: Process 12">
+            <a:extLst>
+              <a:ext uri="{FF2B5EF4-FFF2-40B4-BE49-F238E27FC236}">
+                <a16:creationId xmlns:a16="http://schemas.microsoft.com/office/drawing/2014/main" id="{26DF5D43-C707-DDDB-8DFA-5BC6597D438F}"/>
+              </a:ext>
+            </a:extLst>
+          </p:cNvPr>
+          <p:cNvSpPr/>
+          <p:nvPr/>
+        </p:nvSpPr>
+        <p:spPr>
+          <a:xfrm>
+            <a:off x="10458575" y="2143581"/>
+            <a:ext cx="1742358" cy="800375"/>
+          </a:xfrm>
+          <a:prstGeom prst="flowChartProcess">
+            <a:avLst/>
+          </a:prstGeom>
+          <a:solidFill>
+            <a:schemeClr val="bg1"/>
+          </a:solidFill>
+          <a:ln w="38100">
+            <a:solidFill>
+              <a:schemeClr val="tx1">
+                <a:lumMod val="50000"/>
+                <a:lumOff val="50000"/>
+              </a:schemeClr>
+            </a:solidFill>
+          </a:ln>
+        </p:spPr>
+        <p:style>
+          <a:lnRef idx="2">
+            <a:schemeClr val="accent1">
+              <a:shade val="50000"/>
+            </a:schemeClr>
+          </a:lnRef>
+          <a:fillRef idx="1">
+            <a:schemeClr val="accent1"/>
+          </a:fillRef>
+          <a:effectRef idx="0">
+            <a:schemeClr val="accent1"/>
+          </a:effectRef>
+          <a:fontRef idx="minor">
+            <a:schemeClr val="lt1"/>
+          </a:fontRef>
+        </p:style>
+        <p:txBody>
+          <a:bodyPr rtlCol="0" anchor="t"/>
+          <a:lstStyle/>
+          <a:p>
+            <a:pPr algn="ctr"/>
+            <a:r>
+              <a:rPr lang="en-US" b="1" dirty="0">
+                <a:solidFill>
+                  <a:schemeClr val="tx1"/>
+                </a:solidFill>
+              </a:rPr>
+              <a:t>style.py</a:t>
+            </a:r>
+          </a:p>
+          <a:p>
+            <a:r>
+              <a:rPr lang="en-US" sz="1600" dirty="0">
+                <a:solidFill>
+                  <a:schemeClr val="tx1"/>
+                </a:solidFill>
+              </a:rPr>
+              <a:t>Defines node and edge styles.</a:t>
+            </a:r>
+          </a:p>
+        </p:txBody>
+      </p:sp>
+      <p:cxnSp>
+        <p:nvCxnSpPr>
+          <p:cNvPr id="15" name="Straight Arrow Connector 14">
+            <a:extLst>
+              <a:ext uri="{FF2B5EF4-FFF2-40B4-BE49-F238E27FC236}">
+                <a16:creationId xmlns:a16="http://schemas.microsoft.com/office/drawing/2014/main" id="{01C4125A-EAED-FF7E-18A7-EFF67A7FB8C9}"/>
+              </a:ext>
+            </a:extLst>
+          </p:cNvPr>
+          <p:cNvCxnSpPr>
+            <a:cxnSpLocks/>
+          </p:cNvCxnSpPr>
+          <p:nvPr/>
+        </p:nvCxnSpPr>
+        <p:spPr>
+          <a:xfrm flipV="1">
+            <a:off x="9513325" y="2943956"/>
+            <a:ext cx="0" cy="454565"/>
+          </a:xfrm>
+          <a:prstGeom prst="straightConnector1">
+            <a:avLst/>
+          </a:prstGeom>
+          <a:ln w="38100">
+            <a:solidFill>
+              <a:schemeClr val="accent6"/>
+            </a:solidFill>
+            <a:prstDash val="solid"/>
+            <a:tailEnd type="triangle"/>
+          </a:ln>
+        </p:spPr>
+        <p:style>
+          <a:lnRef idx="1">
+            <a:schemeClr val="accent1"/>
+          </a:lnRef>
+          <a:fillRef idx="0">
+            <a:schemeClr val="accent1"/>
+          </a:fillRef>
+          <a:effectRef idx="0">
+            <a:schemeClr val="accent1"/>
+          </a:effectRef>
+          <a:fontRef idx="minor">
+            <a:schemeClr val="tx1"/>
+          </a:fontRef>
+        </p:style>
+      </p:cxnSp>
+      <p:cxnSp>
+        <p:nvCxnSpPr>
+          <p:cNvPr id="16" name="Straight Arrow Connector 15">
+            <a:extLst>
+              <a:ext uri="{FF2B5EF4-FFF2-40B4-BE49-F238E27FC236}">
+                <a16:creationId xmlns:a16="http://schemas.microsoft.com/office/drawing/2014/main" id="{EA53837F-3657-A60D-41A1-BA981EA87136}"/>
+              </a:ext>
+            </a:extLst>
+          </p:cNvPr>
+          <p:cNvCxnSpPr>
+            <a:cxnSpLocks/>
+          </p:cNvCxnSpPr>
+          <p:nvPr/>
+        </p:nvCxnSpPr>
+        <p:spPr>
+          <a:xfrm flipV="1">
+            <a:off x="11329754" y="2937849"/>
+            <a:ext cx="0" cy="454565"/>
+          </a:xfrm>
+          <a:prstGeom prst="straightConnector1">
+            <a:avLst/>
+          </a:prstGeom>
+          <a:ln w="38100">
+            <a:solidFill>
+              <a:schemeClr val="accent6"/>
+            </a:solidFill>
+            <a:prstDash val="solid"/>
+            <a:tailEnd type="triangle"/>
+          </a:ln>
+        </p:spPr>
+        <p:style>
+          <a:lnRef idx="1">
+            <a:schemeClr val="accent1"/>
+          </a:lnRef>
+          <a:fillRef idx="0">
+            <a:schemeClr val="accent1"/>
+          </a:fillRef>
+          <a:effectRef idx="0">
+            <a:schemeClr val="accent1"/>
+          </a:effectRef>
+          <a:fontRef idx="minor">
+            <a:schemeClr val="tx1"/>
+          </a:fontRef>
+        </p:style>
+      </p:cxnSp>
+      <p:cxnSp>
+        <p:nvCxnSpPr>
+          <p:cNvPr id="17" name="Straight Arrow Connector 16">
+            <a:extLst>
+              <a:ext uri="{FF2B5EF4-FFF2-40B4-BE49-F238E27FC236}">
+                <a16:creationId xmlns:a16="http://schemas.microsoft.com/office/drawing/2014/main" id="{BA5C5F95-ADB8-495F-227D-B258CCF4A766}"/>
+              </a:ext>
+            </a:extLst>
+          </p:cNvPr>
+          <p:cNvCxnSpPr>
+            <a:cxnSpLocks/>
+            <a:stCxn id="12" idx="0"/>
+          </p:cNvCxnSpPr>
+          <p:nvPr/>
+        </p:nvCxnSpPr>
+        <p:spPr>
+          <a:xfrm flipH="1" flipV="1">
+            <a:off x="10458456" y="4532109"/>
+            <a:ext cx="8070" cy="382082"/>
           </a:xfrm>
           <a:prstGeom prst="straightConnector1">
             <a:avLst/>
@@ -20180,7 +20579,7 @@
                   <a:schemeClr val="tx1"/>
                 </a:solidFill>
               </a:rPr>
-              <a:t>/analyze/graph.py</a:t>
+              <a:t>/analyze/phases.py</a:t>
             </a:r>
           </a:p>
           <a:p>
@@ -20264,8 +20663,8 @@
         </p:nvSpPr>
         <p:spPr>
           <a:xfrm>
-            <a:off x="816427" y="3719375"/>
-            <a:ext cx="3005832" cy="369332"/>
+            <a:off x="816427" y="3472336"/>
+            <a:ext cx="3005832" cy="646331"/>
           </a:xfrm>
           <a:prstGeom prst="rect">
             <a:avLst/>
@@ -20284,16 +20683,12 @@
           <a:lstStyle/>
           <a:p>
             <a:r>
+              <a:rPr lang="en-US" dirty="0" err="1"/>
+              <a:t>FunctionArchitecture</a:t>
+            </a:r>
+            <a:r>
               <a:rPr lang="en-US" dirty="0"/>
-              <a:t>Model, </a:t>
-            </a:r>
-            <a:r>
-              <a:rPr lang="en-US" dirty="0" err="1"/>
-              <a:t>FxnBlock</a:t>
-            </a:r>
-            <a:r>
-              <a:rPr lang="en-US" dirty="0"/>
-              <a:t>, Flow, State…</a:t>
+              <a:t>, Function, Flow, State…</a:t>
             </a:r>
           </a:p>
         </p:txBody>
@@ -20355,8 +20750,8 @@
         </p:nvSpPr>
         <p:spPr>
           <a:xfrm>
-            <a:off x="3983478" y="1700107"/>
-            <a:ext cx="893321" cy="369332"/>
+            <a:off x="4012278" y="1561606"/>
+            <a:ext cx="893321" cy="646331"/>
           </a:xfrm>
           <a:prstGeom prst="rect">
             <a:avLst/>
@@ -20376,7 +20771,13 @@
           <a:p>
             <a:r>
               <a:rPr lang="en-US" dirty="0"/>
-              <a:t>System</a:t>
+              <a:t>Model</a:t>
+            </a:r>
+          </a:p>
+          <a:p>
+            <a:r>
+              <a:rPr lang="en-US" dirty="0"/>
+              <a:t>Class</a:t>
             </a:r>
           </a:p>
         </p:txBody>
@@ -20560,7 +20961,7 @@
           <a:p>
             <a:r>
               <a:rPr lang="en-US" dirty="0" err="1"/>
-              <a:t>ModelGraph</a:t>
+              <a:t>PhaseMap</a:t>
             </a:r>
             <a:r>
               <a:rPr lang="en-US" dirty="0"/>
@@ -23004,7 +23405,7 @@
           <a:p>
             <a:fld id="{5B2B2ECE-C27A-4FBC-A5B7-24ADD502157D}" type="datetime1">
               <a:rPr lang="en-US" smtClean="0"/>
-              <a:t>5/16/2024</a:t>
+              <a:t>12/11/2024</a:t>
             </a:fld>
             <a:endParaRPr lang="en-US"/>
           </a:p>
@@ -23224,7 +23625,7 @@
           <a:p>
             <a:fld id="{C8D67213-7DC7-4566-B4E8-39CBEF03CE40}" type="datetime1">
               <a:rPr lang="en-US" smtClean="0"/>
-              <a:t>5/16/2024</a:t>
+              <a:t>12/11/2024</a:t>
             </a:fld>
             <a:endParaRPr lang="en-US"/>
           </a:p>
@@ -23551,7 +23952,7 @@
           <a:p>
             <a:fld id="{7DBF9849-58D3-4F19-9398-5C19541DD8B5}" type="datetime1">
               <a:rPr lang="en-US" smtClean="0"/>
-              <a:t>5/16/2024</a:t>
+              <a:t>12/11/2024</a:t>
             </a:fld>
             <a:endParaRPr lang="en-US"/>
           </a:p>
@@ -24939,7 +25340,7 @@
           <a:p>
             <a:fld id="{97B5B71A-C210-4A41-9D4A-E72BF6E30274}" type="datetime1">
               <a:rPr lang="en-US" smtClean="0"/>
-              <a:t>5/16/2024</a:t>
+              <a:t>12/11/2024</a:t>
             </a:fld>
             <a:endParaRPr lang="en-US"/>
           </a:p>
@@ -25578,6 +25979,12 @@
 </file>
 
 <file path=customXml/item1.xml><?xml version="1.0" encoding="utf-8"?>
+<p:properties xmlns:p="http://schemas.microsoft.com/office/2006/metadata/properties" xmlns:xsi="http://www.w3.org/2001/XMLSchema-instance" xmlns:pc="http://schemas.microsoft.com/office/infopath/2007/PartnerControls">
+  <documentManagement/>
+</p:properties>
+</file>
+
+<file path=customXml/item2.xml><?xml version="1.0" encoding="utf-8"?>
 <ct:contentTypeSchema xmlns:ct="http://schemas.microsoft.com/office/2006/metadata/contentType" xmlns:ma="http://schemas.microsoft.com/office/2006/metadata/properties/metaAttributes" ct:_="" ma:_="" ma:contentTypeName="Document" ma:contentTypeID="0x0101002F0B4413AAFFE34B9A5E0B87EBB2BF4F" ma:contentTypeVersion="0" ma:contentTypeDescription="Create a new document." ma:contentTypeScope="" ma:versionID="9632435baf965c6c093711282b9a8698">
   <xsd:schema xmlns:xsd="http://www.w3.org/2001/XMLSchema" xmlns:xs="http://www.w3.org/2001/XMLSchema" xmlns:p="http://schemas.microsoft.com/office/2006/metadata/properties" targetNamespace="http://schemas.microsoft.com/office/2006/metadata/properties" ma:root="true" ma:fieldsID="ad47a0f10127d9e30d85633090e6731d">
     <xsd:element name="properties">
@@ -25691,12 +26098,6 @@
 </ct:contentTypeSchema>
 </file>
 
-<file path=customXml/item2.xml><?xml version="1.0" encoding="utf-8"?>
-<p:properties xmlns:p="http://schemas.microsoft.com/office/2006/metadata/properties" xmlns:xsi="http://www.w3.org/2001/XMLSchema-instance" xmlns:pc="http://schemas.microsoft.com/office/infopath/2007/PartnerControls">
-  <documentManagement/>
-</p:properties>
-</file>
-
 <file path=customXml/item3.xml><?xml version="1.0" encoding="utf-8"?>
 <?mso-contentType ?>
 <FormTemplates xmlns="http://schemas.microsoft.com/sharepoint/v3/contenttype/forms">
@@ -25707,6 +26108,21 @@
 </file>
 
 <file path=customXml/itemProps1.xml><?xml version="1.0" encoding="utf-8"?>
+<ds:datastoreItem xmlns:ds="http://schemas.openxmlformats.org/officeDocument/2006/customXml" ds:itemID="{92B7266E-DF44-460A-A16F-F5ABEAF9A56A}">
+  <ds:schemaRefs>
+    <ds:schemaRef ds:uri="http://schemas.microsoft.com/office/2006/metadata/properties"/>
+    <ds:schemaRef ds:uri="http://purl.org/dc/terms/"/>
+    <ds:schemaRef ds:uri="http://schemas.openxmlformats.org/package/2006/metadata/core-properties"/>
+    <ds:schemaRef ds:uri="http://purl.org/dc/dcmitype/"/>
+    <ds:schemaRef ds:uri="http://schemas.microsoft.com/office/infopath/2007/PartnerControls"/>
+    <ds:schemaRef ds:uri="http://schemas.microsoft.com/office/2006/documentManagement/types"/>
+    <ds:schemaRef ds:uri="http://purl.org/dc/elements/1.1/"/>
+    <ds:schemaRef ds:uri="http://www.w3.org/XML/1998/namespace"/>
+  </ds:schemaRefs>
+</ds:datastoreItem>
+</file>
+
+<file path=customXml/itemProps2.xml><?xml version="1.0" encoding="utf-8"?>
 <ds:datastoreItem xmlns:ds="http://schemas.openxmlformats.org/officeDocument/2006/customXml" ds:itemID="{8807AEC1-3868-4489-99AA-F6101CBA6951}">
   <ds:schemaRefs>
     <ds:schemaRef ds:uri="http://schemas.microsoft.com/office/2006/metadata/contentType"/>
@@ -25722,21 +26138,6 @@
 </ds:datastoreItem>
 </file>
 
-<file path=customXml/itemProps2.xml><?xml version="1.0" encoding="utf-8"?>
-<ds:datastoreItem xmlns:ds="http://schemas.openxmlformats.org/officeDocument/2006/customXml" ds:itemID="{92B7266E-DF44-460A-A16F-F5ABEAF9A56A}">
-  <ds:schemaRefs>
-    <ds:schemaRef ds:uri="http://purl.org/dc/terms/"/>
-    <ds:schemaRef ds:uri="http://schemas.openxmlformats.org/package/2006/metadata/core-properties"/>
-    <ds:schemaRef ds:uri="http://purl.org/dc/dcmitype/"/>
-    <ds:schemaRef ds:uri="http://schemas.microsoft.com/office/infopath/2007/PartnerControls"/>
-    <ds:schemaRef ds:uri="http://schemas.microsoft.com/office/2006/documentManagement/types"/>
-    <ds:schemaRef ds:uri="http://purl.org/dc/elements/1.1/"/>
-    <ds:schemaRef ds:uri="http://schemas.microsoft.com/office/2006/metadata/properties"/>
-    <ds:schemaRef ds:uri="http://www.w3.org/XML/1998/namespace"/>
-  </ds:schemaRefs>
-</ds:datastoreItem>
-</file>
-
 <file path=customXml/itemProps3.xml><?xml version="1.0" encoding="utf-8"?>
 <ds:datastoreItem xmlns:ds="http://schemas.openxmlformats.org/officeDocument/2006/customXml" ds:itemID="{D3728C9A-7C9B-4A99-A7F5-4857043C7DB3}">
   <ds:schemaRefs>

</xml_diff>

<commit_message>
Fixed some documentation issues with the tutorial
- Fixed some figures in tutorial that were out of date
- Update docs to improve figures (may need to update docs update plan also)
- See: RAD-510
</commit_message>
<xml_diff>
--- a/docs-source/figures/powerpoint/powerpoint_figures.pptx
+++ b/docs-source/figures/powerpoint/powerpoint_figures.pptx
@@ -212,7 +212,7 @@
           <a:p>
             <a:fld id="{711A52A6-9D8E-41FC-9651-78B3E515F872}" type="datetimeFigureOut">
               <a:rPr lang="en-US" smtClean="0"/>
-              <a:t>12/11/2024</a:t>
+              <a:t>6/10/2025</a:t>
             </a:fld>
             <a:endParaRPr lang="en-US"/>
           </a:p>
@@ -639,7 +639,7 @@
           <a:p>
             <a:fld id="{77F775AD-3704-4F98-A581-F4E052B5E341}" type="datetime1">
               <a:rPr lang="en-US" smtClean="0"/>
-              <a:t>12/11/2024</a:t>
+              <a:t>6/10/2025</a:t>
             </a:fld>
             <a:endParaRPr lang="en-US" dirty="0"/>
           </a:p>
@@ -888,7 +888,7 @@
           <a:p>
             <a:fld id="{B49B97F0-8049-4B63-9B9F-B08800B08AEA}" type="datetime1">
               <a:rPr lang="en-US" smtClean="0"/>
-              <a:t>12/11/2024</a:t>
+              <a:t>6/10/2025</a:t>
             </a:fld>
             <a:endParaRPr lang="en-US"/>
           </a:p>
@@ -1128,7 +1128,7 @@
           <a:p>
             <a:fld id="{76BB3555-78C2-4894-951A-9F28C24107FA}" type="datetime1">
               <a:rPr lang="en-US" smtClean="0"/>
-              <a:t>12/11/2024</a:t>
+              <a:t>6/10/2025</a:t>
             </a:fld>
             <a:endParaRPr lang="en-US"/>
           </a:p>
@@ -1358,7 +1358,7 @@
           <a:p>
             <a:fld id="{37A4B9B3-CD86-4259-A27A-F9B9C6081119}" type="datetime1">
               <a:rPr lang="en-US" smtClean="0"/>
-              <a:t>12/11/2024</a:t>
+              <a:t>6/10/2025</a:t>
             </a:fld>
             <a:endParaRPr lang="en-US"/>
           </a:p>
@@ -1636,7 +1636,7 @@
           <a:p>
             <a:fld id="{66287512-E62E-4968-99B9-D028D358C1D6}" type="datetime1">
               <a:rPr lang="en-US" smtClean="0"/>
-              <a:t>12/11/2024</a:t>
+              <a:t>6/10/2025</a:t>
             </a:fld>
             <a:endParaRPr lang="en-US"/>
           </a:p>
@@ -1959,7 +1959,7 @@
           <a:p>
             <a:fld id="{356AD7E7-9EE9-4D28-82A7-0AE338FFEED9}" type="datetime1">
               <a:rPr lang="en-US" smtClean="0"/>
-              <a:t>12/11/2024</a:t>
+              <a:t>6/10/2025</a:t>
             </a:fld>
             <a:endParaRPr lang="en-US"/>
           </a:p>
@@ -2433,7 +2433,7 @@
           <a:p>
             <a:fld id="{0B5CD5E0-6150-412F-8881-52709F06EC3B}" type="datetime1">
               <a:rPr lang="en-US" smtClean="0"/>
-              <a:t>12/11/2024</a:t>
+              <a:t>6/10/2025</a:t>
             </a:fld>
             <a:endParaRPr lang="en-US"/>
           </a:p>
@@ -2580,7 +2580,7 @@
           <a:p>
             <a:fld id="{9428AFA3-5281-4B53-8B8B-8FD665A2F0D7}" type="datetime1">
               <a:rPr lang="en-US" smtClean="0"/>
-              <a:t>12/11/2024</a:t>
+              <a:t>6/10/2025</a:t>
             </a:fld>
             <a:endParaRPr lang="en-US"/>
           </a:p>
@@ -2693,7 +2693,7 @@
           <a:p>
             <a:fld id="{556D1394-26AC-45DA-9E25-AB3CC25C7422}" type="datetime1">
               <a:rPr lang="en-US" smtClean="0"/>
-              <a:t>12/11/2024</a:t>
+              <a:t>6/10/2025</a:t>
             </a:fld>
             <a:endParaRPr lang="en-US"/>
           </a:p>
@@ -3018,7 +3018,7 @@
           <a:p>
             <a:fld id="{B641D803-18D9-4B72-95D8-021B736F630F}" type="datetime1">
               <a:rPr lang="en-US" smtClean="0"/>
-              <a:t>12/11/2024</a:t>
+              <a:t>6/10/2025</a:t>
             </a:fld>
             <a:endParaRPr lang="en-US"/>
           </a:p>
@@ -3310,7 +3310,7 @@
           <a:p>
             <a:fld id="{9F82DFCB-4787-4629-B4F0-DCD676BE203A}" type="datetime1">
               <a:rPr lang="en-US" smtClean="0"/>
-              <a:t>12/11/2024</a:t>
+              <a:t>6/10/2025</a:t>
             </a:fld>
             <a:endParaRPr lang="en-US"/>
           </a:p>
@@ -3550,7 +3550,7 @@
           <a:p>
             <a:fld id="{300C2ECC-D91C-40D5-A01C-469FC90F0645}" type="datetime1">
               <a:rPr lang="en-US" smtClean="0"/>
-              <a:t>12/11/2024</a:t>
+              <a:t>6/10/2025</a:t>
             </a:fld>
             <a:endParaRPr lang="en-US" dirty="0"/>
           </a:p>
@@ -5813,7 +5813,9 @@
               </a:ext>
             </a:extLst>
           </p:cNvPr>
-          <p:cNvCxnSpPr/>
+          <p:cNvCxnSpPr>
+            <a:cxnSpLocks/>
+          </p:cNvCxnSpPr>
           <p:nvPr/>
         </p:nvCxnSpPr>
         <p:spPr>
@@ -5923,7 +5925,7 @@
           </a:solidFill>
         </p:spPr>
         <p:txBody>
-          <a:bodyPr wrap="none" rtlCol="0">
+          <a:bodyPr wrap="square" rtlCol="0">
             <a:spAutoFit/>
           </a:bodyPr>
           <a:lstStyle/>
@@ -6154,8 +6156,8 @@
         </p:nvSpPr>
         <p:spPr>
           <a:xfrm>
-            <a:off x="4550374" y="5155292"/>
-            <a:ext cx="3091249" cy="1200329"/>
+            <a:off x="2581532" y="5155292"/>
+            <a:ext cx="6925962" cy="646331"/>
           </a:xfrm>
           <a:prstGeom prst="rect">
             <a:avLst/>
@@ -6177,10 +6179,8 @@
               <a:rPr lang="en-US" dirty="0">
                 <a:latin typeface="Bahnschrift" panose="020B0502040204020203" pitchFamily="34" charset="0"/>
               </a:rPr>
-              <a:t>Resilience to a set of fault modes over a set of operational parameters</a:t>
-            </a:r>
-          </a:p>
-          <a:p>
+              <a:t>Resilience to a set of fault modes over a set of operational parameters </a:t>
+            </a:r>
             <a:r>
               <a:rPr lang="en-US" b="1" dirty="0" err="1"/>
               <a:t>propagate.nested_sample</a:t>
@@ -6396,7 +6396,7 @@
         <p:spPr>
           <a:xfrm>
             <a:off x="8716097" y="1525889"/>
-            <a:ext cx="3475903" cy="5145772"/>
+            <a:ext cx="3475903" cy="4827246"/>
           </a:xfrm>
           <a:prstGeom prst="flowChartProcess">
             <a:avLst/>
@@ -6828,7 +6828,7 @@
         </p:blipFill>
         <p:spPr bwMode="auto">
           <a:xfrm>
-            <a:off x="10079855" y="6092619"/>
+            <a:off x="10067377" y="5777241"/>
             <a:ext cx="2048671" cy="458284"/>
           </a:xfrm>
           <a:prstGeom prst="rect">
@@ -6860,8 +6860,8 @@
         </p:nvSpPr>
         <p:spPr>
           <a:xfrm>
-            <a:off x="1" y="186340"/>
-            <a:ext cx="12117786" cy="884985"/>
+            <a:off x="1" y="466132"/>
+            <a:ext cx="12117786" cy="605193"/>
           </a:xfrm>
           <a:prstGeom prst="flowChartProcess">
             <a:avLst/>
@@ -7558,7 +7558,7 @@
         </p:nvSpPr>
         <p:spPr>
           <a:xfrm>
-            <a:off x="8804525" y="3392414"/>
+            <a:off x="8804525" y="3225525"/>
             <a:ext cx="3324001" cy="1139695"/>
           </a:xfrm>
           <a:prstGeom prst="flowChartProcess">
@@ -7740,7 +7740,7 @@
         </p:nvSpPr>
         <p:spPr>
           <a:xfrm>
-            <a:off x="8804525" y="4914191"/>
+            <a:off x="8792047" y="4622627"/>
             <a:ext cx="3324001" cy="1139695"/>
           </a:xfrm>
           <a:prstGeom prst="flowChartProcess">
@@ -7928,7 +7928,7 @@
         <p:spPr>
           <a:xfrm flipV="1">
             <a:off x="9513325" y="2943956"/>
-            <a:ext cx="0" cy="454565"/>
+            <a:ext cx="0" cy="281569"/>
           </a:xfrm>
           <a:prstGeom prst="straightConnector1">
             <a:avLst/>
@@ -7973,7 +7973,7 @@
         <p:spPr>
           <a:xfrm flipV="1">
             <a:off x="11329754" y="2937849"/>
-            <a:ext cx="0" cy="454565"/>
+            <a:ext cx="0" cy="287676"/>
           </a:xfrm>
           <a:prstGeom prst="straightConnector1">
             <a:avLst/>
@@ -8012,14 +8012,13 @@
           </p:cNvPr>
           <p:cNvCxnSpPr>
             <a:cxnSpLocks/>
-            <a:stCxn id="12" idx="0"/>
           </p:cNvCxnSpPr>
           <p:nvPr/>
         </p:nvCxnSpPr>
         <p:spPr>
-          <a:xfrm flipH="1" flipV="1">
-            <a:off x="10458456" y="4532109"/>
-            <a:ext cx="8070" cy="382082"/>
+          <a:xfrm flipV="1">
+            <a:off x="10466525" y="4330630"/>
+            <a:ext cx="0" cy="286137"/>
           </a:xfrm>
           <a:prstGeom prst="straightConnector1">
             <a:avLst/>
@@ -8091,7 +8090,7 @@
         </p:nvSpPr>
         <p:spPr>
           <a:xfrm>
-            <a:off x="646999" y="4990293"/>
+            <a:off x="646999" y="4653965"/>
             <a:ext cx="1583017" cy="347848"/>
           </a:xfrm>
           <a:prstGeom prst="rect">
@@ -8150,7 +8149,7 @@
         </p:nvSpPr>
         <p:spPr>
           <a:xfrm>
-            <a:off x="613775" y="4704663"/>
+            <a:off x="613775" y="4368335"/>
             <a:ext cx="2334698" cy="347847"/>
           </a:xfrm>
           <a:prstGeom prst="rect">
@@ -8216,7 +8215,7 @@
         </p:nvSpPr>
         <p:spPr>
           <a:xfrm>
-            <a:off x="646999" y="4101560"/>
+            <a:off x="646999" y="3765232"/>
             <a:ext cx="4100829" cy="665117"/>
           </a:xfrm>
           <a:prstGeom prst="rect">
@@ -8779,7 +8778,7 @@
         </p:nvSpPr>
         <p:spPr>
           <a:xfrm>
-            <a:off x="438079" y="4018053"/>
+            <a:off x="438079" y="3681725"/>
             <a:ext cx="5533509" cy="1287625"/>
           </a:xfrm>
           <a:prstGeom prst="rect">
@@ -8826,21 +8825,13 @@
           <a:p>
             <a:r>
               <a:rPr lang="en-US" sz="1600" dirty="0"/>
-              <a:t>    </a:t>
-            </a:r>
-            <a:r>
-              <a:rPr lang="en-US" sz="1600" dirty="0" err="1"/>
-              <a:t>fm_args</a:t>
-            </a:r>
+              <a:t>    fault_faultname1 = (0.001, 200.0),</a:t>
+            </a:r>
+          </a:p>
+          <a:p>
             <a:r>
               <a:rPr lang="en-US" sz="1600" dirty="0"/>
-              <a:t> = {‘fault_1’: (0.001, 200.0),</a:t>
-            </a:r>
-          </a:p>
-          <a:p>
-            <a:r>
-              <a:rPr lang="en-US" sz="1600" dirty="0"/>
-              <a:t>	    ‘fault_2’: 0.00001, 100.0, {‘on’: 1.0}}</a:t>
+              <a:t>    fault_faultname2 = (0.00001, 100.0, {‘on’: 1.0})</a:t>
             </a:r>
           </a:p>
           <a:p>
@@ -8854,7 +8845,7 @@
             </a:r>
             <a:r>
               <a:rPr lang="en-US" sz="1600" dirty="0"/>
-              <a:t> = [“off”, “on”]</a:t>
+              <a:t> = (“off”, “on”)</a:t>
             </a:r>
           </a:p>
           <a:p>
@@ -8949,7 +8940,7 @@
         </p:nvSpPr>
         <p:spPr>
           <a:xfrm>
-            <a:off x="344774" y="3219160"/>
+            <a:off x="432935" y="3030090"/>
             <a:ext cx="5856980" cy="646331"/>
           </a:xfrm>
           <a:prstGeom prst="rect">
@@ -9314,8 +9305,8 @@
         </p:nvSpPr>
         <p:spPr>
           <a:xfrm>
-            <a:off x="8676496" y="1267352"/>
-            <a:ext cx="3411894" cy="521602"/>
+            <a:off x="8244483" y="1265737"/>
+            <a:ext cx="2780869" cy="521602"/>
           </a:xfrm>
           <a:prstGeom prst="rect">
             <a:avLst/>
@@ -9384,8 +9375,8 @@
         </p:nvCxnSpPr>
         <p:spPr>
           <a:xfrm flipH="1">
-            <a:off x="7793276" y="1528153"/>
-            <a:ext cx="883220" cy="11398"/>
+            <a:off x="7779701" y="1526538"/>
+            <a:ext cx="464782" cy="0"/>
           </a:xfrm>
           <a:prstGeom prst="straightConnector1">
             <a:avLst/>
@@ -9429,7 +9420,7 @@
         </p:nvSpPr>
         <p:spPr>
           <a:xfrm>
-            <a:off x="5214557" y="2530578"/>
+            <a:off x="5214557" y="2479817"/>
             <a:ext cx="4854792" cy="334094"/>
           </a:xfrm>
           <a:prstGeom prst="rect">
@@ -9500,7 +9491,7 @@
         <p:spPr>
           <a:xfrm flipV="1">
             <a:off x="7641953" y="2272208"/>
-            <a:ext cx="1" cy="258370"/>
+            <a:ext cx="1" cy="207609"/>
           </a:xfrm>
           <a:prstGeom prst="straightConnector1">
             <a:avLst/>
@@ -9543,7 +9534,7 @@
         </p:nvSpPr>
         <p:spPr>
           <a:xfrm>
-            <a:off x="5801318" y="4088555"/>
+            <a:off x="5801318" y="3752227"/>
             <a:ext cx="4900894" cy="665117"/>
           </a:xfrm>
           <a:prstGeom prst="rect">
@@ -9610,7 +9601,7 @@
         </p:nvCxnSpPr>
         <p:spPr>
           <a:xfrm flipH="1">
-            <a:off x="4747828" y="4423437"/>
+            <a:off x="4747828" y="4087109"/>
             <a:ext cx="1053490" cy="10682"/>
           </a:xfrm>
           <a:prstGeom prst="straightConnector1">
@@ -9652,7 +9643,7 @@
         </p:nvSpPr>
         <p:spPr>
           <a:xfrm>
-            <a:off x="5801318" y="4776505"/>
+            <a:off x="5801317" y="4399342"/>
             <a:ext cx="3921180" cy="347847"/>
           </a:xfrm>
           <a:prstGeom prst="rect">
@@ -9729,9 +9720,9 @@
           <p:nvPr/>
         </p:nvCxnSpPr>
         <p:spPr>
-          <a:xfrm flipH="1" flipV="1">
-            <a:off x="2948473" y="4906580"/>
-            <a:ext cx="2852845" cy="43849"/>
+          <a:xfrm flipH="1">
+            <a:off x="2948473" y="4573266"/>
+            <a:ext cx="2852844" cy="9645"/>
           </a:xfrm>
           <a:prstGeom prst="straightConnector1">
             <a:avLst/>
@@ -9772,7 +9763,7 @@
         </p:nvSpPr>
         <p:spPr>
           <a:xfrm>
-            <a:off x="5801317" y="5135015"/>
+            <a:off x="5801317" y="4747189"/>
             <a:ext cx="3566617" cy="347848"/>
           </a:xfrm>
           <a:prstGeom prst="rect">
@@ -9837,8 +9828,8 @@
         </p:nvCxnSpPr>
         <p:spPr>
           <a:xfrm flipH="1" flipV="1">
-            <a:off x="2230016" y="5198660"/>
-            <a:ext cx="3571301" cy="110279"/>
+            <a:off x="2263240" y="4875589"/>
+            <a:ext cx="3538077" cy="45524"/>
           </a:xfrm>
           <a:prstGeom prst="straightConnector1">
             <a:avLst/>
@@ -9909,7 +9900,7 @@
         </p:nvSpPr>
         <p:spPr>
           <a:xfrm>
-            <a:off x="964163" y="2011624"/>
+            <a:off x="596306" y="2011624"/>
             <a:ext cx="3626498" cy="554296"/>
           </a:xfrm>
           <a:prstGeom prst="rect">
@@ -9968,7 +9959,7 @@
         </p:nvSpPr>
         <p:spPr>
           <a:xfrm>
-            <a:off x="881967" y="2688349"/>
+            <a:off x="514110" y="2688349"/>
             <a:ext cx="5285570" cy="1089457"/>
           </a:xfrm>
           <a:prstGeom prst="rect">
@@ -10027,7 +10018,7 @@
         </p:nvSpPr>
         <p:spPr>
           <a:xfrm>
-            <a:off x="994846" y="2378458"/>
+            <a:off x="626989" y="2378458"/>
             <a:ext cx="2349924" cy="318971"/>
           </a:xfrm>
           <a:prstGeom prst="rect">
@@ -10086,7 +10077,7 @@
         </p:nvSpPr>
         <p:spPr>
           <a:xfrm>
-            <a:off x="1104123" y="1587759"/>
+            <a:off x="736266" y="1587759"/>
             <a:ext cx="1188098" cy="410613"/>
           </a:xfrm>
           <a:prstGeom prst="rect">
@@ -10152,7 +10143,7 @@
         </p:nvSpPr>
         <p:spPr>
           <a:xfrm>
-            <a:off x="857957" y="1395203"/>
+            <a:off x="490100" y="1395203"/>
             <a:ext cx="5337571" cy="2592113"/>
           </a:xfrm>
           <a:prstGeom prst="rect">
@@ -10219,10 +10210,7 @@
               <a:rPr lang="en-US" sz="1600" dirty="0" err="1"/>
               <a:t>StateName</a:t>
             </a:r>
-            <a:r>
-              <a:rPr lang="en-US" sz="1600" dirty="0"/>
-              <a:t>()</a:t>
-            </a:r>
+            <a:endParaRPr lang="en-US" sz="1600" dirty="0"/>
           </a:p>
           <a:p>
             <a:r>
@@ -10241,10 +10229,7 @@
               <a:rPr lang="en-US" sz="1600" dirty="0" err="1"/>
               <a:t>ParameterName</a:t>
             </a:r>
-            <a:r>
-              <a:rPr lang="en-US" sz="1600" dirty="0"/>
-              <a:t>()</a:t>
-            </a:r>
+            <a:endParaRPr lang="en-US" sz="1600" dirty="0"/>
           </a:p>
           <a:p>
             <a:r>
@@ -10329,8 +10314,8 @@
         </p:nvSpPr>
         <p:spPr>
           <a:xfrm>
-            <a:off x="6651007" y="1203650"/>
-            <a:ext cx="4982547" cy="794722"/>
+            <a:off x="6283150" y="1453846"/>
+            <a:ext cx="5540993" cy="544525"/>
           </a:xfrm>
           <a:prstGeom prst="rect">
             <a:avLst/>
@@ -10425,8 +10410,8 @@
         </p:nvCxnSpPr>
         <p:spPr>
           <a:xfrm flipH="1">
-            <a:off x="2292221" y="1601011"/>
-            <a:ext cx="4358786" cy="204012"/>
+            <a:off x="1924364" y="1726109"/>
+            <a:ext cx="4358786" cy="78914"/>
           </a:xfrm>
           <a:prstGeom prst="straightConnector1">
             <a:avLst/>
@@ -10467,8 +10452,8 @@
         </p:nvSpPr>
         <p:spPr>
           <a:xfrm>
-            <a:off x="6653122" y="2066925"/>
-            <a:ext cx="4602318" cy="630504"/>
+            <a:off x="6285265" y="2066925"/>
+            <a:ext cx="5538878" cy="630504"/>
           </a:xfrm>
           <a:prstGeom prst="rect">
             <a:avLst/>
@@ -10564,7 +10549,7 @@
         </p:nvCxnSpPr>
         <p:spPr>
           <a:xfrm flipH="1" flipV="1">
-            <a:off x="4545732" y="2323532"/>
+            <a:off x="4177875" y="2323532"/>
             <a:ext cx="2107390" cy="58645"/>
           </a:xfrm>
           <a:prstGeom prst="straightConnector1">
@@ -10603,8 +10588,8 @@
         </p:nvSpPr>
         <p:spPr>
           <a:xfrm>
-            <a:off x="6977578" y="3987316"/>
-            <a:ext cx="3040112" cy="740651"/>
+            <a:off x="6283150" y="3478717"/>
+            <a:ext cx="5540993" cy="508600"/>
           </a:xfrm>
           <a:prstGeom prst="rect">
             <a:avLst/>
@@ -10700,8 +10685,8 @@
         </p:nvCxnSpPr>
         <p:spPr>
           <a:xfrm flipH="1" flipV="1">
-            <a:off x="5719665" y="3215938"/>
-            <a:ext cx="1257913" cy="1141704"/>
+            <a:off x="5065991" y="3426469"/>
+            <a:ext cx="1217159" cy="306548"/>
           </a:xfrm>
           <a:prstGeom prst="straightConnector1">
             <a:avLst/>
@@ -10742,8 +10727,8 @@
         </p:nvSpPr>
         <p:spPr>
           <a:xfrm>
-            <a:off x="6651007" y="2749676"/>
-            <a:ext cx="5152219" cy="1089457"/>
+            <a:off x="6283150" y="2749677"/>
+            <a:ext cx="5540993" cy="740652"/>
           </a:xfrm>
           <a:prstGeom prst="rect">
             <a:avLst/>
@@ -10897,7 +10882,7 @@
                   <a:schemeClr val="tx1"/>
                 </a:solidFill>
               </a:rPr>
-              <a:t>). Overwritten by the track parameter during model instantiation.</a:t>
+              <a:t>). Overwritten by track parameter at model instantiation.</a:t>
             </a:r>
           </a:p>
         </p:txBody>
@@ -10918,7 +10903,7 @@
         </p:nvCxnSpPr>
         <p:spPr>
           <a:xfrm flipH="1" flipV="1">
-            <a:off x="3228392" y="2586456"/>
+            <a:off x="2860535" y="2586456"/>
             <a:ext cx="3422615" cy="371346"/>
           </a:xfrm>
           <a:prstGeom prst="straightConnector1">
@@ -11044,121 +11029,6 @@
       </p:sp>
       <p:sp>
         <p:nvSpPr>
-          <p:cNvPr id="46" name="Rectangle 45">
-            <a:extLst>
-              <a:ext uri="{FF2B5EF4-FFF2-40B4-BE49-F238E27FC236}">
-                <a16:creationId xmlns:a16="http://schemas.microsoft.com/office/drawing/2014/main" id="{72127004-8A7D-A358-ADEB-B3629DBFE527}"/>
-              </a:ext>
-            </a:extLst>
-          </p:cNvPr>
-          <p:cNvSpPr/>
-          <p:nvPr/>
-        </p:nvSpPr>
-        <p:spPr>
-          <a:xfrm>
-            <a:off x="3860814" y="5838288"/>
-            <a:ext cx="6392648" cy="856947"/>
-          </a:xfrm>
-          <a:prstGeom prst="rect">
-            <a:avLst/>
-          </a:prstGeom>
-          <a:solidFill>
-            <a:srgbClr val="F1D9F1"/>
-          </a:solidFill>
-          <a:ln>
-            <a:noFill/>
-          </a:ln>
-        </p:spPr>
-        <p:style>
-          <a:lnRef idx="2">
-            <a:schemeClr val="accent1">
-              <a:shade val="15000"/>
-            </a:schemeClr>
-          </a:lnRef>
-          <a:fillRef idx="1">
-            <a:schemeClr val="accent1"/>
-          </a:fillRef>
-          <a:effectRef idx="0">
-            <a:schemeClr val="accent1"/>
-          </a:effectRef>
-          <a:fontRef idx="minor">
-            <a:schemeClr val="lt1"/>
-          </a:fontRef>
-        </p:style>
-        <p:txBody>
-          <a:bodyPr rtlCol="0" anchor="ctr"/>
-          <a:lstStyle/>
-          <a:p>
-            <a:pPr algn="ctr"/>
-            <a:endParaRPr lang="en-US" sz="1400" b="1" dirty="0">
-              <a:solidFill>
-                <a:schemeClr val="tx1"/>
-              </a:solidFill>
-            </a:endParaRPr>
-          </a:p>
-        </p:txBody>
-      </p:sp>
-      <p:sp>
-        <p:nvSpPr>
-          <p:cNvPr id="12" name="Rectangle 11">
-            <a:extLst>
-              <a:ext uri="{FF2B5EF4-FFF2-40B4-BE49-F238E27FC236}">
-                <a16:creationId xmlns:a16="http://schemas.microsoft.com/office/drawing/2014/main" id="{E3774B39-3B4C-D81E-872A-828DD7656DFD}"/>
-              </a:ext>
-            </a:extLst>
-          </p:cNvPr>
-          <p:cNvSpPr/>
-          <p:nvPr/>
-        </p:nvSpPr>
-        <p:spPr>
-          <a:xfrm>
-            <a:off x="3830098" y="5073270"/>
-            <a:ext cx="6430023" cy="768917"/>
-          </a:xfrm>
-          <a:prstGeom prst="rect">
-            <a:avLst/>
-          </a:prstGeom>
-          <a:solidFill>
-            <a:schemeClr val="accent6">
-              <a:lumMod val="20000"/>
-              <a:lumOff val="80000"/>
-            </a:schemeClr>
-          </a:solidFill>
-          <a:ln>
-            <a:noFill/>
-          </a:ln>
-        </p:spPr>
-        <p:style>
-          <a:lnRef idx="2">
-            <a:schemeClr val="accent1">
-              <a:shade val="15000"/>
-            </a:schemeClr>
-          </a:lnRef>
-          <a:fillRef idx="1">
-            <a:schemeClr val="accent1"/>
-          </a:fillRef>
-          <a:effectRef idx="0">
-            <a:schemeClr val="accent1"/>
-          </a:effectRef>
-          <a:fontRef idx="minor">
-            <a:schemeClr val="lt1"/>
-          </a:fontRef>
-        </p:style>
-        <p:txBody>
-          <a:bodyPr rtlCol="0" anchor="ctr"/>
-          <a:lstStyle/>
-          <a:p>
-            <a:pPr algn="ctr"/>
-            <a:endParaRPr lang="en-US" sz="1400" dirty="0">
-              <a:solidFill>
-                <a:schemeClr val="tx1"/>
-              </a:solidFill>
-            </a:endParaRPr>
-          </a:p>
-        </p:txBody>
-      </p:sp>
-      <p:sp>
-        <p:nvSpPr>
           <p:cNvPr id="36" name="Rectangle 35">
             <a:extLst>
               <a:ext uri="{FF2B5EF4-FFF2-40B4-BE49-F238E27FC236}">
@@ -11485,10 +11355,10 @@
       </p:sp>
       <p:sp>
         <p:nvSpPr>
-          <p:cNvPr id="6" name="Rectangle 5">
-            <a:extLst>
-              <a:ext uri="{FF2B5EF4-FFF2-40B4-BE49-F238E27FC236}">
-                <a16:creationId xmlns:a16="http://schemas.microsoft.com/office/drawing/2014/main" id="{5D85A8FA-8E6E-79A7-59E0-7676B5C606A4}"/>
+          <p:cNvPr id="10" name="Rectangle 9">
+            <a:extLst>
+              <a:ext uri="{FF2B5EF4-FFF2-40B4-BE49-F238E27FC236}">
+                <a16:creationId xmlns:a16="http://schemas.microsoft.com/office/drawing/2014/main" id="{FF99E59A-7941-6350-EE6B-CB334F86800C}"/>
               </a:ext>
             </a:extLst>
           </p:cNvPr>
@@ -11497,430 +11367,8 @@
         </p:nvSpPr>
         <p:spPr>
           <a:xfrm>
-            <a:off x="3815764" y="132784"/>
-            <a:ext cx="6436682" cy="6547028"/>
-          </a:xfrm>
-          <a:prstGeom prst="rect">
-            <a:avLst/>
-          </a:prstGeom>
-          <a:noFill/>
-          <a:ln w="28575">
-            <a:solidFill>
-              <a:schemeClr val="accent1"/>
-            </a:solidFill>
-          </a:ln>
-        </p:spPr>
-        <p:style>
-          <a:lnRef idx="2">
-            <a:schemeClr val="dk1"/>
-          </a:lnRef>
-          <a:fillRef idx="1">
-            <a:schemeClr val="lt1"/>
-          </a:fillRef>
-          <a:effectRef idx="0">
-            <a:schemeClr val="dk1"/>
-          </a:effectRef>
-          <a:fontRef idx="minor">
-            <a:schemeClr val="dk1"/>
-          </a:fontRef>
-        </p:style>
-        <p:txBody>
-          <a:bodyPr rtlCol="0" anchor="t"/>
-          <a:lstStyle/>
-          <a:p>
-            <a:r>
-              <a:rPr lang="en-US" sz="1600" dirty="0"/>
-              <a:t>class </a:t>
-            </a:r>
-            <a:r>
-              <a:rPr lang="en-US" sz="1600" dirty="0" err="1"/>
-              <a:t>FunctionName</a:t>
-            </a:r>
-            <a:r>
-              <a:rPr lang="en-US" sz="1600" dirty="0"/>
-              <a:t>(Function):</a:t>
-            </a:r>
-          </a:p>
-          <a:p>
-            <a:r>
-              <a:rPr lang="en-US" sz="1600" dirty="0"/>
-              <a:t>    __slots__ =(‘flowname1’,)</a:t>
-            </a:r>
-          </a:p>
-          <a:p>
-            <a:r>
-              <a:rPr lang="en-US" sz="1600" dirty="0"/>
-              <a:t>    </a:t>
-            </a:r>
-            <a:r>
-              <a:rPr lang="en-US" sz="1600" dirty="0" err="1"/>
-              <a:t>container_s</a:t>
-            </a:r>
-            <a:r>
-              <a:rPr lang="en-US" sz="1600" dirty="0"/>
-              <a:t> = </a:t>
-            </a:r>
-            <a:r>
-              <a:rPr lang="en-US" sz="1600" dirty="0" err="1"/>
-              <a:t>FunctionState</a:t>
-            </a:r>
-            <a:endParaRPr lang="en-US" sz="1600" dirty="0"/>
-          </a:p>
-          <a:p>
-            <a:r>
-              <a:rPr lang="en-US" sz="1600" dirty="0"/>
-              <a:t>    </a:t>
-            </a:r>
-            <a:r>
-              <a:rPr lang="en-US" sz="1600" dirty="0" err="1"/>
-              <a:t>container_m</a:t>
-            </a:r>
-            <a:r>
-              <a:rPr lang="en-US" sz="1600" dirty="0"/>
-              <a:t> = </a:t>
-            </a:r>
-            <a:r>
-              <a:rPr lang="en-US" sz="1600" dirty="0" err="1"/>
-              <a:t>FunctionMode</a:t>
-            </a:r>
-            <a:endParaRPr lang="en-US" sz="1600" dirty="0"/>
-          </a:p>
-          <a:p>
-            <a:r>
-              <a:rPr lang="en-US" sz="1600" dirty="0"/>
-              <a:t>    </a:t>
-            </a:r>
-            <a:r>
-              <a:rPr lang="en-US" sz="1600" dirty="0" err="1"/>
-              <a:t>container_t</a:t>
-            </a:r>
-            <a:r>
-              <a:rPr lang="en-US" sz="1600" dirty="0"/>
-              <a:t> = </a:t>
-            </a:r>
-            <a:r>
-              <a:rPr lang="en-US" sz="1600" dirty="0" err="1"/>
-              <a:t>FunctionTime</a:t>
-            </a:r>
-            <a:endParaRPr lang="en-US" sz="1600" dirty="0"/>
-          </a:p>
-          <a:p>
-            <a:r>
-              <a:rPr lang="en-US" sz="1600" dirty="0"/>
-              <a:t>    flow_flowname1 = FlowClass1</a:t>
-            </a:r>
-          </a:p>
-          <a:p>
-            <a:r>
-              <a:rPr lang="en-US" sz="1600" dirty="0"/>
-              <a:t>    </a:t>
-            </a:r>
-            <a:r>
-              <a:rPr lang="en-US" sz="1600" dirty="0" err="1"/>
-              <a:t>flownames</a:t>
-            </a:r>
-            <a:r>
-              <a:rPr lang="en-US" sz="1600" dirty="0"/>
-              <a:t> = {“outsideflowname”:”flowname1”}</a:t>
-            </a:r>
-          </a:p>
-          <a:p>
-            <a:r>
-              <a:rPr lang="en-US" sz="1600" dirty="0"/>
-              <a:t>    </a:t>
-            </a:r>
-            <a:r>
-              <a:rPr lang="en-US" sz="1600" dirty="0" err="1"/>
-              <a:t>default_sp</a:t>
-            </a:r>
-            <a:r>
-              <a:rPr lang="en-US" sz="1600" dirty="0"/>
-              <a:t> = {‘</a:t>
-            </a:r>
-            <a:r>
-              <a:rPr lang="en-US" sz="1600" dirty="0" err="1"/>
-              <a:t>end_time</a:t>
-            </a:r>
-            <a:r>
-              <a:rPr lang="en-US" sz="1600" dirty="0"/>
-              <a:t>’: </a:t>
-            </a:r>
-            <a:r>
-              <a:rPr lang="en-US" sz="1600" dirty="0">
-                <a:sym typeface="Wingdings" panose="05000000000000000000" pitchFamily="2" charset="2"/>
-              </a:rPr>
-              <a:t>100</a:t>
-            </a:r>
-            <a:r>
-              <a:rPr lang="en-US" sz="1600" dirty="0"/>
-              <a:t>}</a:t>
-            </a:r>
-          </a:p>
-          <a:p>
-            <a:r>
-              <a:rPr lang="en-US" sz="1600" dirty="0"/>
-              <a:t>    </a:t>
-            </a:r>
-            <a:r>
-              <a:rPr lang="en-US" sz="1600" dirty="0" err="1"/>
-              <a:t>default_track</a:t>
-            </a:r>
-            <a:r>
-              <a:rPr lang="en-US" sz="1600" dirty="0"/>
-              <a:t> = [‘</a:t>
-            </a:r>
-            <a:r>
-              <a:rPr lang="en-US" sz="1600" dirty="0" err="1"/>
-              <a:t>s’,’m</a:t>
-            </a:r>
-            <a:r>
-              <a:rPr lang="en-US" sz="1600" dirty="0"/>
-              <a:t>’]</a:t>
-            </a:r>
-          </a:p>
-          <a:p>
-            <a:r>
-              <a:rPr lang="en-US" sz="1600" dirty="0"/>
-              <a:t>    def </a:t>
-            </a:r>
-            <a:r>
-              <a:rPr lang="en-US" sz="1600" dirty="0" err="1"/>
-              <a:t>init_block</a:t>
-            </a:r>
-            <a:r>
-              <a:rPr lang="en-US" sz="1600" dirty="0"/>
-              <a:t>(self, **</a:t>
-            </a:r>
-            <a:r>
-              <a:rPr lang="en-US" sz="1600" dirty="0" err="1"/>
-              <a:t>kwargs</a:t>
-            </a:r>
-            <a:r>
-              <a:rPr lang="en-US" sz="1600" dirty="0"/>
-              <a:t>):</a:t>
-            </a:r>
-          </a:p>
-          <a:p>
-            <a:r>
-              <a:rPr lang="en-US" sz="1600" dirty="0"/>
-              <a:t>        &lt;e.g., </a:t>
-            </a:r>
-            <a:r>
-              <a:rPr lang="en-US" sz="1600" dirty="0" err="1"/>
-              <a:t>self.s.x</a:t>
-            </a:r>
-            <a:r>
-              <a:rPr lang="en-US" sz="1600" dirty="0"/>
-              <a:t> = 2.0&gt;</a:t>
-            </a:r>
-          </a:p>
-          <a:p>
-            <a:r>
-              <a:rPr lang="en-US" sz="1600" dirty="0"/>
-              <a:t>   def </a:t>
-            </a:r>
-            <a:r>
-              <a:rPr lang="en-US" sz="1600" dirty="0" err="1"/>
-              <a:t>static_behavior</a:t>
-            </a:r>
-            <a:r>
-              <a:rPr lang="en-US" sz="1600" dirty="0"/>
-              <a:t>(self, time):</a:t>
-            </a:r>
-          </a:p>
-          <a:p>
-            <a:r>
-              <a:rPr lang="en-US" sz="1600" dirty="0"/>
-              <a:t>        </a:t>
-            </a:r>
-            <a:r>
-              <a:rPr lang="en-US" sz="1600" dirty="0">
-                <a:highlight>
-                  <a:srgbClr val="00FFFF"/>
-                </a:highlight>
-              </a:rPr>
-              <a:t>Runs only in static propagation steps</a:t>
-            </a:r>
-          </a:p>
-          <a:p>
-            <a:r>
-              <a:rPr lang="en-US" sz="1600" dirty="0"/>
-              <a:t>    def </a:t>
-            </a:r>
-            <a:r>
-              <a:rPr lang="en-US" sz="1600" dirty="0" err="1"/>
-              <a:t>dynamic_behavior</a:t>
-            </a:r>
-            <a:r>
-              <a:rPr lang="en-US" sz="1600" dirty="0"/>
-              <a:t>(self, time):</a:t>
-            </a:r>
-          </a:p>
-          <a:p>
-            <a:r>
-              <a:rPr lang="en-US" sz="1600" dirty="0"/>
-              <a:t>        </a:t>
-            </a:r>
-            <a:r>
-              <a:rPr lang="en-US" sz="1600" dirty="0">
-                <a:highlight>
-                  <a:srgbClr val="00FFFF"/>
-                </a:highlight>
-              </a:rPr>
-              <a:t>Runs only in dynamic propagation steps</a:t>
-            </a:r>
-          </a:p>
-          <a:p>
-            <a:r>
-              <a:rPr lang="en-US" sz="1600" dirty="0"/>
-              <a:t>     def behavior(self, time):</a:t>
-            </a:r>
-          </a:p>
-          <a:p>
-            <a:r>
-              <a:rPr lang="en-US" sz="1600" dirty="0"/>
-              <a:t>        </a:t>
-            </a:r>
-            <a:r>
-              <a:rPr lang="en-US" sz="1600" dirty="0">
-                <a:highlight>
-                  <a:srgbClr val="00FFFF"/>
-                </a:highlight>
-              </a:rPr>
-              <a:t>Runs in static propagation step (same as </a:t>
-            </a:r>
-            <a:r>
-              <a:rPr lang="en-US" sz="1600" dirty="0" err="1">
-                <a:highlight>
-                  <a:srgbClr val="00FFFF"/>
-                </a:highlight>
-              </a:rPr>
-              <a:t>static_behavior</a:t>
-            </a:r>
-            <a:r>
-              <a:rPr lang="en-US" sz="1600" dirty="0">
-                <a:highlight>
-                  <a:srgbClr val="00FFFF"/>
-                </a:highlight>
-              </a:rPr>
-              <a:t>)</a:t>
-            </a:r>
-            <a:endParaRPr lang="en-US" sz="1600" dirty="0"/>
-          </a:p>
-          <a:p>
-            <a:r>
-              <a:rPr lang="en-US" sz="1600" dirty="0"/>
-              <a:t>    def </a:t>
-            </a:r>
-            <a:r>
-              <a:rPr lang="en-US" sz="1600" dirty="0" err="1"/>
-              <a:t>condfaults</a:t>
-            </a:r>
-            <a:r>
-              <a:rPr lang="en-US" sz="1600" dirty="0"/>
-              <a:t>(self, time):</a:t>
-            </a:r>
-          </a:p>
-          <a:p>
-            <a:r>
-              <a:rPr lang="en-US" sz="1600" dirty="0"/>
-              <a:t>        </a:t>
-            </a:r>
-            <a:r>
-              <a:rPr lang="en-US" sz="1600" dirty="0">
-                <a:highlight>
-                  <a:srgbClr val="00FFFF"/>
-                </a:highlight>
-              </a:rPr>
-              <a:t>Runs in both static and dynamic propagation steps prior to behaviors and internal fault propagation (to components  and actions)</a:t>
-            </a:r>
-          </a:p>
-          <a:p>
-            <a:r>
-              <a:rPr lang="en-US" sz="1600" dirty="0"/>
-              <a:t>    def </a:t>
-            </a:r>
-            <a:r>
-              <a:rPr lang="en-US" sz="1600" dirty="0" err="1"/>
-              <a:t>indicate_XXX</a:t>
-            </a:r>
-            <a:r>
-              <a:rPr lang="en-US" sz="1600" dirty="0"/>
-              <a:t>(self, time):</a:t>
-            </a:r>
-          </a:p>
-          <a:p>
-            <a:r>
-              <a:rPr lang="en-US" sz="1600" dirty="0"/>
-              <a:t>        </a:t>
-            </a:r>
-            <a:r>
-              <a:rPr lang="en-US" sz="1600" dirty="0">
-                <a:highlight>
-                  <a:srgbClr val="00FF00"/>
-                </a:highlight>
-              </a:rPr>
-              <a:t>Conditional statement (e.g., </a:t>
-            </a:r>
-            <a:r>
-              <a:rPr lang="en-US" sz="1600" dirty="0" err="1">
-                <a:highlight>
-                  <a:srgbClr val="00FF00"/>
-                </a:highlight>
-              </a:rPr>
-              <a:t>self.s.state</a:t>
-            </a:r>
-            <a:r>
-              <a:rPr lang="en-US" sz="1600" dirty="0">
-                <a:highlight>
-                  <a:srgbClr val="00FF00"/>
-                </a:highlight>
-              </a:rPr>
-              <a:t>&gt;threshold) which is logged in the history and may be used to terminate simulations</a:t>
-            </a:r>
-          </a:p>
-          <a:p>
-            <a:r>
-              <a:rPr lang="en-US" sz="1600" dirty="0"/>
-              <a:t>    def </a:t>
-            </a:r>
-            <a:r>
-              <a:rPr lang="en-US" sz="1600" dirty="0" err="1"/>
-              <a:t>find_classification</a:t>
-            </a:r>
-            <a:r>
-              <a:rPr lang="en-US" sz="1600" dirty="0"/>
-              <a:t>(self, time):</a:t>
-            </a:r>
-          </a:p>
-          <a:p>
-            <a:r>
-              <a:rPr lang="en-US" sz="1600" dirty="0">
-                <a:highlight>
-                  <a:srgbClr val="E997E9"/>
-                </a:highlight>
-              </a:rPr>
-              <a:t>        Returns a Result dictionary (calculated at completion)</a:t>
-            </a:r>
-          </a:p>
-        </p:txBody>
-      </p:sp>
-      <p:sp>
-        <p:nvSpPr>
-          <p:cNvPr id="10" name="Rectangle 9">
-            <a:extLst>
-              <a:ext uri="{FF2B5EF4-FFF2-40B4-BE49-F238E27FC236}">
-                <a16:creationId xmlns:a16="http://schemas.microsoft.com/office/drawing/2014/main" id="{FF99E59A-7941-6350-EE6B-CB334F86800C}"/>
-              </a:ext>
-            </a:extLst>
-          </p:cNvPr>
-          <p:cNvSpPr/>
-          <p:nvPr/>
-        </p:nvSpPr>
-        <p:spPr>
-          <a:xfrm>
-            <a:off x="151599" y="2003056"/>
-            <a:ext cx="3328941" cy="1410896"/>
+            <a:off x="0" y="1782889"/>
+            <a:ext cx="3480540" cy="1090300"/>
           </a:xfrm>
           <a:prstGeom prst="rect">
             <a:avLst/>
@@ -12093,8 +11541,8 @@
         </p:nvSpPr>
         <p:spPr>
           <a:xfrm>
-            <a:off x="257946" y="525811"/>
-            <a:ext cx="3222594" cy="1325627"/>
+            <a:off x="0" y="648352"/>
+            <a:ext cx="3480540" cy="1170144"/>
           </a:xfrm>
           <a:prstGeom prst="rect">
             <a:avLst/>
@@ -12642,8 +12090,8 @@
         </p:nvSpPr>
         <p:spPr>
           <a:xfrm>
-            <a:off x="257946" y="3693884"/>
-            <a:ext cx="3040112" cy="952215"/>
+            <a:off x="0" y="2873190"/>
+            <a:ext cx="3480540" cy="725362"/>
           </a:xfrm>
           <a:prstGeom prst="rect">
             <a:avLst/>
@@ -12743,8 +12191,8 @@
         </p:nvCxnSpPr>
         <p:spPr>
           <a:xfrm>
-            <a:off x="3284738" y="4239718"/>
-            <a:ext cx="538701" cy="0"/>
+            <a:off x="3480540" y="3475090"/>
+            <a:ext cx="351149" cy="0"/>
           </a:xfrm>
           <a:prstGeom prst="straightConnector1">
             <a:avLst/>
@@ -12782,8 +12230,8 @@
         </p:nvSpPr>
         <p:spPr>
           <a:xfrm>
-            <a:off x="256648" y="5010793"/>
-            <a:ext cx="3040112" cy="740651"/>
+            <a:off x="1" y="3637400"/>
+            <a:ext cx="3480540" cy="717405"/>
           </a:xfrm>
           <a:prstGeom prst="rect">
             <a:avLst/>
@@ -12996,8 +12444,8 @@
         </p:nvCxnSpPr>
         <p:spPr>
           <a:xfrm>
-            <a:off x="3300089" y="5435810"/>
-            <a:ext cx="538701" cy="0"/>
+            <a:off x="3480540" y="4070949"/>
+            <a:ext cx="384809" cy="0"/>
           </a:xfrm>
           <a:prstGeom prst="straightConnector1">
             <a:avLst/>
@@ -13038,8 +12486,8 @@
         </p:nvSpPr>
         <p:spPr>
           <a:xfrm>
-            <a:off x="258934" y="5860828"/>
-            <a:ext cx="3038135" cy="665117"/>
+            <a:off x="1" y="4346769"/>
+            <a:ext cx="3474004" cy="665117"/>
           </a:xfrm>
           <a:prstGeom prst="rect">
             <a:avLst/>
@@ -13107,8 +12555,8 @@
         </p:nvCxnSpPr>
         <p:spPr>
           <a:xfrm>
-            <a:off x="3317536" y="6209647"/>
-            <a:ext cx="538701" cy="0"/>
+            <a:off x="3480540" y="4717178"/>
+            <a:ext cx="384809" cy="0"/>
           </a:xfrm>
           <a:prstGeom prst="straightConnector1">
             <a:avLst/>
@@ -13255,6 +12703,478 @@
           </a:fontRef>
         </p:style>
       </p:cxnSp>
+      <p:sp>
+        <p:nvSpPr>
+          <p:cNvPr id="12" name="Rectangle 11">
+            <a:extLst>
+              <a:ext uri="{FF2B5EF4-FFF2-40B4-BE49-F238E27FC236}">
+                <a16:creationId xmlns:a16="http://schemas.microsoft.com/office/drawing/2014/main" id="{E3774B39-3B4C-D81E-872A-828DD7656DFD}"/>
+              </a:ext>
+            </a:extLst>
+          </p:cNvPr>
+          <p:cNvSpPr/>
+          <p:nvPr/>
+        </p:nvSpPr>
+        <p:spPr>
+          <a:xfrm>
+            <a:off x="3819093" y="3854765"/>
+            <a:ext cx="6430023" cy="768917"/>
+          </a:xfrm>
+          <a:prstGeom prst="rect">
+            <a:avLst/>
+          </a:prstGeom>
+          <a:solidFill>
+            <a:schemeClr val="accent6">
+              <a:lumMod val="20000"/>
+              <a:lumOff val="80000"/>
+            </a:schemeClr>
+          </a:solidFill>
+          <a:ln>
+            <a:noFill/>
+          </a:ln>
+        </p:spPr>
+        <p:style>
+          <a:lnRef idx="2">
+            <a:schemeClr val="accent1">
+              <a:shade val="15000"/>
+            </a:schemeClr>
+          </a:lnRef>
+          <a:fillRef idx="1">
+            <a:schemeClr val="accent1"/>
+          </a:fillRef>
+          <a:effectRef idx="0">
+            <a:schemeClr val="accent1"/>
+          </a:effectRef>
+          <a:fontRef idx="minor">
+            <a:schemeClr val="lt1"/>
+          </a:fontRef>
+        </p:style>
+        <p:txBody>
+          <a:bodyPr rtlCol="0" anchor="ctr"/>
+          <a:lstStyle/>
+          <a:p>
+            <a:pPr algn="ctr"/>
+            <a:endParaRPr lang="en-US" sz="1400" dirty="0">
+              <a:solidFill>
+                <a:schemeClr val="tx1"/>
+              </a:solidFill>
+            </a:endParaRPr>
+          </a:p>
+        </p:txBody>
+      </p:sp>
+      <p:sp>
+        <p:nvSpPr>
+          <p:cNvPr id="46" name="Rectangle 45">
+            <a:extLst>
+              <a:ext uri="{FF2B5EF4-FFF2-40B4-BE49-F238E27FC236}">
+                <a16:creationId xmlns:a16="http://schemas.microsoft.com/office/drawing/2014/main" id="{72127004-8A7D-A358-ADEB-B3629DBFE527}"/>
+              </a:ext>
+            </a:extLst>
+          </p:cNvPr>
+          <p:cNvSpPr/>
+          <p:nvPr/>
+        </p:nvSpPr>
+        <p:spPr>
+          <a:xfrm>
+            <a:off x="3814747" y="4570834"/>
+            <a:ext cx="6392648" cy="507638"/>
+          </a:xfrm>
+          <a:prstGeom prst="rect">
+            <a:avLst/>
+          </a:prstGeom>
+          <a:solidFill>
+            <a:srgbClr val="F1D9F1"/>
+          </a:solidFill>
+          <a:ln>
+            <a:noFill/>
+          </a:ln>
+        </p:spPr>
+        <p:style>
+          <a:lnRef idx="2">
+            <a:schemeClr val="accent1">
+              <a:shade val="15000"/>
+            </a:schemeClr>
+          </a:lnRef>
+          <a:fillRef idx="1">
+            <a:schemeClr val="accent1"/>
+          </a:fillRef>
+          <a:effectRef idx="0">
+            <a:schemeClr val="accent1"/>
+          </a:effectRef>
+          <a:fontRef idx="minor">
+            <a:schemeClr val="lt1"/>
+          </a:fontRef>
+        </p:style>
+        <p:txBody>
+          <a:bodyPr rtlCol="0" anchor="ctr"/>
+          <a:lstStyle/>
+          <a:p>
+            <a:pPr algn="ctr"/>
+            <a:endParaRPr lang="en-US" sz="1400" b="1" dirty="0">
+              <a:solidFill>
+                <a:schemeClr val="tx1"/>
+              </a:solidFill>
+            </a:endParaRPr>
+          </a:p>
+        </p:txBody>
+      </p:sp>
+      <p:sp>
+        <p:nvSpPr>
+          <p:cNvPr id="6" name="Rectangle 5">
+            <a:extLst>
+              <a:ext uri="{FF2B5EF4-FFF2-40B4-BE49-F238E27FC236}">
+                <a16:creationId xmlns:a16="http://schemas.microsoft.com/office/drawing/2014/main" id="{5D85A8FA-8E6E-79A7-59E0-7676B5C606A4}"/>
+              </a:ext>
+            </a:extLst>
+          </p:cNvPr>
+          <p:cNvSpPr/>
+          <p:nvPr/>
+        </p:nvSpPr>
+        <p:spPr>
+          <a:xfrm>
+            <a:off x="3815764" y="132785"/>
+            <a:ext cx="6436682" cy="4945688"/>
+          </a:xfrm>
+          <a:prstGeom prst="rect">
+            <a:avLst/>
+          </a:prstGeom>
+          <a:noFill/>
+          <a:ln w="28575">
+            <a:solidFill>
+              <a:schemeClr val="accent1"/>
+            </a:solidFill>
+          </a:ln>
+        </p:spPr>
+        <p:style>
+          <a:lnRef idx="2">
+            <a:schemeClr val="dk1"/>
+          </a:lnRef>
+          <a:fillRef idx="1">
+            <a:schemeClr val="lt1"/>
+          </a:fillRef>
+          <a:effectRef idx="0">
+            <a:schemeClr val="dk1"/>
+          </a:effectRef>
+          <a:fontRef idx="minor">
+            <a:schemeClr val="dk1"/>
+          </a:fontRef>
+        </p:style>
+        <p:txBody>
+          <a:bodyPr rtlCol="0" anchor="t"/>
+          <a:lstStyle/>
+          <a:p>
+            <a:r>
+              <a:rPr lang="en-US" sz="1600" dirty="0"/>
+              <a:t>class </a:t>
+            </a:r>
+            <a:r>
+              <a:rPr lang="en-US" sz="1600" dirty="0" err="1"/>
+              <a:t>FunctionName</a:t>
+            </a:r>
+            <a:r>
+              <a:rPr lang="en-US" sz="1600" dirty="0"/>
+              <a:t>(Function):</a:t>
+            </a:r>
+          </a:p>
+          <a:p>
+            <a:r>
+              <a:rPr lang="en-US" sz="1600" dirty="0"/>
+              <a:t>    __slots__ =(‘flowname1’,)</a:t>
+            </a:r>
+          </a:p>
+          <a:p>
+            <a:r>
+              <a:rPr lang="en-US" sz="1600" dirty="0"/>
+              <a:t>    </a:t>
+            </a:r>
+            <a:r>
+              <a:rPr lang="en-US" sz="1600" dirty="0" err="1"/>
+              <a:t>container_s</a:t>
+            </a:r>
+            <a:r>
+              <a:rPr lang="en-US" sz="1600" dirty="0"/>
+              <a:t> = </a:t>
+            </a:r>
+            <a:r>
+              <a:rPr lang="en-US" sz="1600" dirty="0" err="1"/>
+              <a:t>FunctionState</a:t>
+            </a:r>
+            <a:endParaRPr lang="en-US" sz="1600" dirty="0"/>
+          </a:p>
+          <a:p>
+            <a:r>
+              <a:rPr lang="en-US" sz="1600" dirty="0"/>
+              <a:t>    </a:t>
+            </a:r>
+            <a:r>
+              <a:rPr lang="en-US" sz="1600" dirty="0" err="1"/>
+              <a:t>container_m</a:t>
+            </a:r>
+            <a:r>
+              <a:rPr lang="en-US" sz="1600" dirty="0"/>
+              <a:t> = </a:t>
+            </a:r>
+            <a:r>
+              <a:rPr lang="en-US" sz="1600" dirty="0" err="1"/>
+              <a:t>FunctionMode</a:t>
+            </a:r>
+            <a:endParaRPr lang="en-US" sz="1600" dirty="0"/>
+          </a:p>
+          <a:p>
+            <a:r>
+              <a:rPr lang="en-US" sz="1600" dirty="0"/>
+              <a:t>    </a:t>
+            </a:r>
+            <a:r>
+              <a:rPr lang="en-US" sz="1600" dirty="0" err="1"/>
+              <a:t>container_t</a:t>
+            </a:r>
+            <a:r>
+              <a:rPr lang="en-US" sz="1600" dirty="0"/>
+              <a:t> = </a:t>
+            </a:r>
+            <a:r>
+              <a:rPr lang="en-US" sz="1600" dirty="0" err="1"/>
+              <a:t>FunctionTime</a:t>
+            </a:r>
+            <a:endParaRPr lang="en-US" sz="1600" dirty="0"/>
+          </a:p>
+          <a:p>
+            <a:r>
+              <a:rPr lang="en-US" sz="1600" dirty="0"/>
+              <a:t>    flow_flowname1 = FlowClass1</a:t>
+            </a:r>
+          </a:p>
+          <a:p>
+            <a:r>
+              <a:rPr lang="en-US" sz="1600" dirty="0"/>
+              <a:t>    </a:t>
+            </a:r>
+            <a:r>
+              <a:rPr lang="en-US" sz="1600" dirty="0" err="1"/>
+              <a:t>flownames</a:t>
+            </a:r>
+            <a:r>
+              <a:rPr lang="en-US" sz="1600" dirty="0"/>
+              <a:t> = {“outsideflowname”:”flowname1”}</a:t>
+            </a:r>
+          </a:p>
+          <a:p>
+            <a:r>
+              <a:rPr lang="en-US" sz="1600" dirty="0"/>
+              <a:t>    </a:t>
+            </a:r>
+            <a:r>
+              <a:rPr lang="en-US" sz="1600" dirty="0" err="1"/>
+              <a:t>default_sp</a:t>
+            </a:r>
+            <a:r>
+              <a:rPr lang="en-US" sz="1600" dirty="0"/>
+              <a:t> = {‘</a:t>
+            </a:r>
+            <a:r>
+              <a:rPr lang="en-US" sz="1600" dirty="0" err="1"/>
+              <a:t>end_time</a:t>
+            </a:r>
+            <a:r>
+              <a:rPr lang="en-US" sz="1600" dirty="0"/>
+              <a:t>’: </a:t>
+            </a:r>
+            <a:r>
+              <a:rPr lang="en-US" sz="1600" dirty="0">
+                <a:sym typeface="Wingdings" panose="05000000000000000000" pitchFamily="2" charset="2"/>
+              </a:rPr>
+              <a:t>100</a:t>
+            </a:r>
+            <a:r>
+              <a:rPr lang="en-US" sz="1600" dirty="0"/>
+              <a:t>}</a:t>
+            </a:r>
+          </a:p>
+          <a:p>
+            <a:r>
+              <a:rPr lang="en-US" sz="1600" dirty="0"/>
+              <a:t>    </a:t>
+            </a:r>
+            <a:r>
+              <a:rPr lang="en-US" sz="1600" dirty="0" err="1"/>
+              <a:t>default_track</a:t>
+            </a:r>
+            <a:r>
+              <a:rPr lang="en-US" sz="1600" dirty="0"/>
+              <a:t> = [‘</a:t>
+            </a:r>
+            <a:r>
+              <a:rPr lang="en-US" sz="1600" dirty="0" err="1"/>
+              <a:t>s’,’m</a:t>
+            </a:r>
+            <a:r>
+              <a:rPr lang="en-US" sz="1600" dirty="0"/>
+              <a:t>’]</a:t>
+            </a:r>
+          </a:p>
+          <a:p>
+            <a:r>
+              <a:rPr lang="en-US" sz="1600" dirty="0"/>
+              <a:t>    def </a:t>
+            </a:r>
+            <a:r>
+              <a:rPr lang="en-US" sz="1600" dirty="0" err="1"/>
+              <a:t>init_block</a:t>
+            </a:r>
+            <a:r>
+              <a:rPr lang="en-US" sz="1600" dirty="0"/>
+              <a:t>(self, **</a:t>
+            </a:r>
+            <a:r>
+              <a:rPr lang="en-US" sz="1600" dirty="0" err="1"/>
+              <a:t>kwargs</a:t>
+            </a:r>
+            <a:r>
+              <a:rPr lang="en-US" sz="1600" dirty="0"/>
+              <a:t>):</a:t>
+            </a:r>
+          </a:p>
+          <a:p>
+            <a:r>
+              <a:rPr lang="en-US" sz="1600" dirty="0"/>
+              <a:t>        &lt;e.g., </a:t>
+            </a:r>
+            <a:r>
+              <a:rPr lang="en-US" sz="1600" dirty="0" err="1"/>
+              <a:t>self.s.x</a:t>
+            </a:r>
+            <a:r>
+              <a:rPr lang="en-US" sz="1600" dirty="0"/>
+              <a:t> = 2.0&gt;</a:t>
+            </a:r>
+          </a:p>
+          <a:p>
+            <a:r>
+              <a:rPr lang="en-US" sz="1600" dirty="0"/>
+              <a:t>   def </a:t>
+            </a:r>
+            <a:r>
+              <a:rPr lang="en-US" sz="1600" dirty="0" err="1"/>
+              <a:t>static_behavior</a:t>
+            </a:r>
+            <a:r>
+              <a:rPr lang="en-US" sz="1600" dirty="0"/>
+              <a:t>(self, time):</a:t>
+            </a:r>
+          </a:p>
+          <a:p>
+            <a:r>
+              <a:rPr lang="en-US" sz="1600" dirty="0"/>
+              <a:t>        </a:t>
+            </a:r>
+            <a:r>
+              <a:rPr lang="en-US" sz="1600" dirty="0">
+                <a:highlight>
+                  <a:srgbClr val="00FFFF"/>
+                </a:highlight>
+              </a:rPr>
+              <a:t>Runs only in static propagation steps</a:t>
+            </a:r>
+          </a:p>
+          <a:p>
+            <a:r>
+              <a:rPr lang="en-US" sz="1600" dirty="0"/>
+              <a:t>    def </a:t>
+            </a:r>
+            <a:r>
+              <a:rPr lang="en-US" sz="1600" dirty="0" err="1"/>
+              <a:t>dynamic_behavior</a:t>
+            </a:r>
+            <a:r>
+              <a:rPr lang="en-US" sz="1600" dirty="0"/>
+              <a:t>(self, time):</a:t>
+            </a:r>
+          </a:p>
+          <a:p>
+            <a:r>
+              <a:rPr lang="en-US" sz="1600" dirty="0"/>
+              <a:t>        </a:t>
+            </a:r>
+            <a:r>
+              <a:rPr lang="en-US" sz="1600" dirty="0">
+                <a:highlight>
+                  <a:srgbClr val="00FFFF"/>
+                </a:highlight>
+              </a:rPr>
+              <a:t>Runs only in dynamic propagation steps</a:t>
+            </a:r>
+          </a:p>
+          <a:p>
+            <a:r>
+              <a:rPr lang="en-US" sz="1600" dirty="0"/>
+              <a:t>def </a:t>
+            </a:r>
+            <a:r>
+              <a:rPr lang="en-US" sz="1600" dirty="0" err="1"/>
+              <a:t>indicate_XXX</a:t>
+            </a:r>
+            <a:r>
+              <a:rPr lang="en-US" sz="1600" dirty="0"/>
+              <a:t>(self, time):</a:t>
+            </a:r>
+          </a:p>
+          <a:p>
+            <a:r>
+              <a:rPr lang="en-US" sz="1600" dirty="0"/>
+              <a:t>        </a:t>
+            </a:r>
+            <a:r>
+              <a:rPr lang="en-US" sz="1600" dirty="0">
+                <a:highlight>
+                  <a:srgbClr val="00FF00"/>
+                </a:highlight>
+              </a:rPr>
+              <a:t>Conditional statement (e.g., </a:t>
+            </a:r>
+            <a:r>
+              <a:rPr lang="en-US" sz="1600" dirty="0" err="1">
+                <a:highlight>
+                  <a:srgbClr val="00FF00"/>
+                </a:highlight>
+              </a:rPr>
+              <a:t>self.s.state</a:t>
+            </a:r>
+            <a:r>
+              <a:rPr lang="en-US" sz="1600" dirty="0">
+                <a:highlight>
+                  <a:srgbClr val="00FF00"/>
+                </a:highlight>
+              </a:rPr>
+              <a:t>&gt;threshold) which is logged in the history and may be used to terminate simulations</a:t>
+            </a:r>
+          </a:p>
+          <a:p>
+            <a:r>
+              <a:rPr lang="en-US" sz="1600" dirty="0"/>
+              <a:t>    def </a:t>
+            </a:r>
+            <a:r>
+              <a:rPr lang="en-US" sz="1600" dirty="0" err="1"/>
+              <a:t>find_classification</a:t>
+            </a:r>
+            <a:r>
+              <a:rPr lang="en-US" sz="1600" dirty="0"/>
+              <a:t>(self, time):</a:t>
+            </a:r>
+          </a:p>
+          <a:p>
+            <a:r>
+              <a:rPr lang="en-US" sz="1600" dirty="0">
+                <a:highlight>
+                  <a:srgbClr val="E997E9"/>
+                </a:highlight>
+              </a:rPr>
+              <a:t>        Returns a Result dictionary (calculated at completion)</a:t>
+            </a:r>
+          </a:p>
+        </p:txBody>
+      </p:sp>
     </p:spTree>
     <p:extLst>
       <p:ext uri="{BB962C8B-B14F-4D97-AF65-F5344CB8AC3E}">
@@ -13287,10 +13207,10 @@
       </p:grpSpPr>
       <p:sp>
         <p:nvSpPr>
-          <p:cNvPr id="46" name="Rectangle 45">
-            <a:extLst>
-              <a:ext uri="{FF2B5EF4-FFF2-40B4-BE49-F238E27FC236}">
-                <a16:creationId xmlns:a16="http://schemas.microsoft.com/office/drawing/2014/main" id="{72127004-8A7D-A358-ADEB-B3629DBFE527}"/>
+          <p:cNvPr id="12" name="Rectangle 11">
+            <a:extLst>
+              <a:ext uri="{FF2B5EF4-FFF2-40B4-BE49-F238E27FC236}">
+                <a16:creationId xmlns:a16="http://schemas.microsoft.com/office/drawing/2014/main" id="{E3774B39-3B4C-D81E-872A-828DD7656DFD}"/>
               </a:ext>
             </a:extLst>
           </p:cNvPr>
@@ -13299,63 +13219,7 @@
         </p:nvSpPr>
         <p:spPr>
           <a:xfrm>
-            <a:off x="3967375" y="5113373"/>
-            <a:ext cx="6697853" cy="843940"/>
-          </a:xfrm>
-          <a:prstGeom prst="rect">
-            <a:avLst/>
-          </a:prstGeom>
-          <a:solidFill>
-            <a:srgbClr val="F1D9F1"/>
-          </a:solidFill>
-          <a:ln>
-            <a:noFill/>
-          </a:ln>
-        </p:spPr>
-        <p:style>
-          <a:lnRef idx="2">
-            <a:schemeClr val="accent1">
-              <a:shade val="15000"/>
-            </a:schemeClr>
-          </a:lnRef>
-          <a:fillRef idx="1">
-            <a:schemeClr val="accent1"/>
-          </a:fillRef>
-          <a:effectRef idx="0">
-            <a:schemeClr val="accent1"/>
-          </a:effectRef>
-          <a:fontRef idx="minor">
-            <a:schemeClr val="lt1"/>
-          </a:fontRef>
-        </p:style>
-        <p:txBody>
-          <a:bodyPr rtlCol="0" anchor="ctr"/>
-          <a:lstStyle/>
-          <a:p>
-            <a:pPr algn="ctr"/>
-            <a:endParaRPr lang="en-US" sz="1400" b="1" dirty="0">
-              <a:solidFill>
-                <a:schemeClr val="tx1"/>
-              </a:solidFill>
-            </a:endParaRPr>
-          </a:p>
-        </p:txBody>
-      </p:sp>
-      <p:sp>
-        <p:nvSpPr>
-          <p:cNvPr id="12" name="Rectangle 11">
-            <a:extLst>
-              <a:ext uri="{FF2B5EF4-FFF2-40B4-BE49-F238E27FC236}">
-                <a16:creationId xmlns:a16="http://schemas.microsoft.com/office/drawing/2014/main" id="{E3774B39-3B4C-D81E-872A-828DD7656DFD}"/>
-              </a:ext>
-            </a:extLst>
-          </p:cNvPr>
-          <p:cNvSpPr/>
-          <p:nvPr/>
-        </p:nvSpPr>
-        <p:spPr>
-          <a:xfrm>
-            <a:off x="3926869" y="3841426"/>
+            <a:off x="3926869" y="3429476"/>
             <a:ext cx="6738360" cy="1178641"/>
           </a:xfrm>
           <a:prstGeom prst="rect">
@@ -13402,6 +13266,62 @@
       </p:sp>
       <p:sp>
         <p:nvSpPr>
+          <p:cNvPr id="46" name="Rectangle 45">
+            <a:extLst>
+              <a:ext uri="{FF2B5EF4-FFF2-40B4-BE49-F238E27FC236}">
+                <a16:creationId xmlns:a16="http://schemas.microsoft.com/office/drawing/2014/main" id="{72127004-8A7D-A358-ADEB-B3629DBFE527}"/>
+              </a:ext>
+            </a:extLst>
+          </p:cNvPr>
+          <p:cNvSpPr/>
+          <p:nvPr/>
+        </p:nvSpPr>
+        <p:spPr>
+          <a:xfrm>
+            <a:off x="3902321" y="4649052"/>
+            <a:ext cx="6697853" cy="843940"/>
+          </a:xfrm>
+          <a:prstGeom prst="rect">
+            <a:avLst/>
+          </a:prstGeom>
+          <a:solidFill>
+            <a:srgbClr val="F1D9F1"/>
+          </a:solidFill>
+          <a:ln>
+            <a:noFill/>
+          </a:ln>
+        </p:spPr>
+        <p:style>
+          <a:lnRef idx="2">
+            <a:schemeClr val="accent1">
+              <a:shade val="15000"/>
+            </a:schemeClr>
+          </a:lnRef>
+          <a:fillRef idx="1">
+            <a:schemeClr val="accent1"/>
+          </a:fillRef>
+          <a:effectRef idx="0">
+            <a:schemeClr val="accent1"/>
+          </a:effectRef>
+          <a:fontRef idx="minor">
+            <a:schemeClr val="lt1"/>
+          </a:fontRef>
+        </p:style>
+        <p:txBody>
+          <a:bodyPr rtlCol="0" anchor="ctr"/>
+          <a:lstStyle/>
+          <a:p>
+            <a:pPr algn="ctr"/>
+            <a:endParaRPr lang="en-US" sz="1400" b="1" dirty="0">
+              <a:solidFill>
+                <a:schemeClr val="tx1"/>
+              </a:solidFill>
+            </a:endParaRPr>
+          </a:p>
+        </p:txBody>
+      </p:sp>
+      <p:sp>
+        <p:nvSpPr>
           <p:cNvPr id="16" name="Rectangle 15">
             <a:extLst>
               <a:ext uri="{FF2B5EF4-FFF2-40B4-BE49-F238E27FC236}">
@@ -13414,8 +13334,8 @@
         </p:nvSpPr>
         <p:spPr>
           <a:xfrm>
-            <a:off x="3926869" y="2024202"/>
-            <a:ext cx="6738360" cy="1723919"/>
+            <a:off x="3926869" y="2024203"/>
+            <a:ext cx="6738360" cy="1478292"/>
           </a:xfrm>
           <a:prstGeom prst="rect">
             <a:avLst/>
@@ -13633,8 +13553,8 @@
         </p:nvSpPr>
         <p:spPr>
           <a:xfrm>
-            <a:off x="3904298" y="659248"/>
-            <a:ext cx="6738360" cy="5238115"/>
+            <a:off x="3904298" y="659249"/>
+            <a:ext cx="6738360" cy="4833744"/>
           </a:xfrm>
           <a:prstGeom prst="rect">
             <a:avLst/>
@@ -13868,9 +13788,6 @@
             <a:endParaRPr lang="en-US" sz="1600" dirty="0"/>
           </a:p>
           <a:p>
-            <a:endParaRPr lang="en-US" sz="1600" dirty="0"/>
-          </a:p>
-          <a:p>
             <a:r>
               <a:rPr lang="en-US" sz="1600" dirty="0"/>
               <a:t>def </a:t>
@@ -14462,8 +14379,8 @@
         </p:nvCxnSpPr>
         <p:spPr>
           <a:xfrm>
-            <a:off x="3232338" y="1588244"/>
-            <a:ext cx="887340" cy="2318"/>
+            <a:off x="3561634" y="1578909"/>
+            <a:ext cx="558044" cy="11653"/>
           </a:xfrm>
           <a:prstGeom prst="straightConnector1">
             <a:avLst/>
@@ -14550,8 +14467,8 @@
         </p:nvSpPr>
         <p:spPr>
           <a:xfrm>
-            <a:off x="380854" y="4106849"/>
-            <a:ext cx="3040112" cy="740651"/>
+            <a:off x="206463" y="3560309"/>
+            <a:ext cx="3214503" cy="740651"/>
           </a:xfrm>
           <a:prstGeom prst="rect">
             <a:avLst/>
@@ -14644,8 +14561,8 @@
         </p:nvSpPr>
         <p:spPr>
           <a:xfrm>
-            <a:off x="170143" y="1049485"/>
-            <a:ext cx="3391491" cy="740658"/>
+            <a:off x="206463" y="1049485"/>
+            <a:ext cx="3355171" cy="740658"/>
           </a:xfrm>
           <a:prstGeom prst="rect">
             <a:avLst/>
@@ -14732,7 +14649,7 @@
         </p:nvCxnSpPr>
         <p:spPr>
           <a:xfrm>
-            <a:off x="3418989" y="4542303"/>
+            <a:off x="3418989" y="3995763"/>
             <a:ext cx="538701" cy="0"/>
           </a:xfrm>
           <a:prstGeom prst="straightConnector1">
@@ -14774,8 +14691,8 @@
         </p:nvSpPr>
         <p:spPr>
           <a:xfrm>
-            <a:off x="380854" y="5119296"/>
-            <a:ext cx="3038135" cy="665117"/>
+            <a:off x="204486" y="4698879"/>
+            <a:ext cx="3214503" cy="665117"/>
           </a:xfrm>
           <a:prstGeom prst="rect">
             <a:avLst/>
@@ -14851,7 +14768,7 @@
         </p:nvCxnSpPr>
         <p:spPr>
           <a:xfrm>
-            <a:off x="3439456" y="5468115"/>
+            <a:off x="3439456" y="5047698"/>
             <a:ext cx="538701" cy="0"/>
           </a:xfrm>
           <a:prstGeom prst="straightConnector1">
@@ -14894,7 +14811,7 @@
         <p:spPr>
           <a:xfrm>
             <a:off x="7716416" y="900686"/>
-            <a:ext cx="4208105" cy="323245"/>
+            <a:ext cx="4277464" cy="299823"/>
           </a:xfrm>
           <a:prstGeom prst="rect">
             <a:avLst/>
@@ -14971,8 +14888,8 @@
         </p:nvCxnSpPr>
         <p:spPr>
           <a:xfrm flipH="1">
-            <a:off x="5467739" y="1062309"/>
-            <a:ext cx="2248677" cy="21740"/>
+            <a:off x="5467739" y="1050598"/>
+            <a:ext cx="2248677" cy="33451"/>
           </a:xfrm>
           <a:prstGeom prst="straightConnector1">
             <a:avLst/>
@@ -15298,7 +15215,7 @@
         </p:nvSpPr>
         <p:spPr>
           <a:xfrm>
-            <a:off x="5573404" y="2915230"/>
+            <a:off x="5331357" y="2461552"/>
             <a:ext cx="632024" cy="2586892"/>
           </a:xfrm>
           <a:prstGeom prst="rect">
@@ -15355,7 +15272,7 @@
         </p:nvCxnSpPr>
         <p:spPr>
           <a:xfrm>
-            <a:off x="1626781" y="1839433"/>
+            <a:off x="1384734" y="1385755"/>
             <a:ext cx="0" cy="4380614"/>
           </a:xfrm>
           <a:prstGeom prst="line">
@@ -15401,7 +15318,7 @@
         </p:nvCxnSpPr>
         <p:spPr>
           <a:xfrm flipH="1">
-            <a:off x="1219201" y="5957778"/>
+            <a:off x="977154" y="5504100"/>
             <a:ext cx="6248399" cy="0"/>
           </a:xfrm>
           <a:prstGeom prst="line">
@@ -15447,7 +15364,7 @@
         </p:nvCxnSpPr>
         <p:spPr>
           <a:xfrm flipH="1">
-            <a:off x="1626781" y="3241215"/>
+            <a:off x="1384734" y="2787537"/>
             <a:ext cx="1360967" cy="0"/>
           </a:xfrm>
           <a:prstGeom prst="line">
@@ -15490,7 +15407,7 @@
         </p:nvCxnSpPr>
         <p:spPr>
           <a:xfrm flipH="1">
-            <a:off x="2987750" y="3234126"/>
+            <a:off x="2745703" y="2780448"/>
             <a:ext cx="1" cy="1858869"/>
           </a:xfrm>
           <a:prstGeom prst="line">
@@ -15536,7 +15453,7 @@
         </p:nvCxnSpPr>
         <p:spPr>
           <a:xfrm flipH="1">
-            <a:off x="1297173" y="4625164"/>
+            <a:off x="1055126" y="4171486"/>
             <a:ext cx="6333459" cy="0"/>
           </a:xfrm>
           <a:prstGeom prst="line">
@@ -15580,7 +15497,7 @@
         </p:nvCxnSpPr>
         <p:spPr>
           <a:xfrm flipH="1" flipV="1">
-            <a:off x="2987749" y="5092995"/>
+            <a:off x="2745702" y="4639317"/>
             <a:ext cx="2758483" cy="15275"/>
           </a:xfrm>
           <a:prstGeom prst="line">
@@ -15626,7 +15543,7 @@
         </p:nvCxnSpPr>
         <p:spPr>
           <a:xfrm flipH="1" flipV="1">
-            <a:off x="2987749" y="3241215"/>
+            <a:off x="2745702" y="2787537"/>
             <a:ext cx="404037" cy="922345"/>
           </a:xfrm>
           <a:prstGeom prst="line">
@@ -15672,7 +15589,7 @@
         </p:nvCxnSpPr>
         <p:spPr>
           <a:xfrm flipV="1">
-            <a:off x="3391786" y="4133164"/>
+            <a:off x="3149739" y="3679486"/>
             <a:ext cx="2512384" cy="30398"/>
           </a:xfrm>
           <a:prstGeom prst="line">
@@ -15718,7 +15635,7 @@
         </p:nvCxnSpPr>
         <p:spPr>
           <a:xfrm flipH="1">
-            <a:off x="1626781" y="3588491"/>
+            <a:off x="1384734" y="3134813"/>
             <a:ext cx="4908698" cy="2406503"/>
           </a:xfrm>
           <a:prstGeom prst="line">
@@ -15762,7 +15679,7 @@
         </p:nvCxnSpPr>
         <p:spPr>
           <a:xfrm flipV="1">
-            <a:off x="4989326" y="3345224"/>
+            <a:off x="4747279" y="2891546"/>
             <a:ext cx="877188" cy="830315"/>
           </a:xfrm>
           <a:prstGeom prst="line">
@@ -15806,7 +15723,7 @@
         </p:nvSpPr>
         <p:spPr>
           <a:xfrm>
-            <a:off x="532600" y="4239606"/>
+            <a:off x="290553" y="3785928"/>
             <a:ext cx="3067493" cy="707886"/>
           </a:xfrm>
           <a:prstGeom prst="rect">
@@ -15841,7 +15758,7 @@
         </p:nvSpPr>
         <p:spPr>
           <a:xfrm>
-            <a:off x="1709375" y="5171768"/>
+            <a:off x="1467328" y="4718090"/>
             <a:ext cx="3067493" cy="707886"/>
           </a:xfrm>
           <a:prstGeom prst="rect">
@@ -15876,7 +15793,7 @@
         </p:nvSpPr>
         <p:spPr>
           <a:xfrm>
-            <a:off x="5668372" y="4902870"/>
+            <a:off x="5426325" y="4449192"/>
             <a:ext cx="425303" cy="409763"/>
           </a:xfrm>
           <a:prstGeom prst="irregularSeal1">
@@ -15925,7 +15842,7 @@
         </p:nvSpPr>
         <p:spPr>
           <a:xfrm>
-            <a:off x="5674573" y="3970657"/>
+            <a:off x="5432526" y="3516979"/>
             <a:ext cx="425303" cy="409763"/>
           </a:xfrm>
           <a:prstGeom prst="irregularSeal1">
@@ -15974,7 +15891,7 @@
         </p:nvSpPr>
         <p:spPr>
           <a:xfrm>
-            <a:off x="5723085" y="3191145"/>
+            <a:off x="5481038" y="2737467"/>
             <a:ext cx="315876" cy="318798"/>
           </a:xfrm>
           <a:prstGeom prst="ellipse">
@@ -16020,7 +15937,7 @@
         </p:nvSpPr>
         <p:spPr>
           <a:xfrm>
-            <a:off x="5415072" y="4281714"/>
+            <a:off x="5173025" y="3828036"/>
             <a:ext cx="1839432" cy="707886"/>
           </a:xfrm>
           <a:prstGeom prst="rect">
@@ -16055,7 +15972,7 @@
         </p:nvSpPr>
         <p:spPr>
           <a:xfrm>
-            <a:off x="1791586" y="1496387"/>
+            <a:off x="1549539" y="1042709"/>
             <a:ext cx="4302088" cy="707886"/>
           </a:xfrm>
           <a:prstGeom prst="rect">
@@ -16103,7 +16020,7 @@
         </p:nvSpPr>
         <p:spPr>
           <a:xfrm>
-            <a:off x="4955603" y="2892027"/>
+            <a:off x="4713556" y="2438349"/>
             <a:ext cx="2046361" cy="400110"/>
           </a:xfrm>
           <a:prstGeom prst="rect">
@@ -16138,7 +16055,7 @@
         </p:nvSpPr>
         <p:spPr>
           <a:xfrm>
-            <a:off x="5059068" y="2472592"/>
+            <a:off x="4817021" y="2018914"/>
             <a:ext cx="1839432" cy="400110"/>
           </a:xfrm>
           <a:prstGeom prst="rect">
@@ -16177,7 +16094,7 @@
         </p:nvSpPr>
         <p:spPr>
           <a:xfrm>
-            <a:off x="6881485" y="2143740"/>
+            <a:off x="6639438" y="1690062"/>
             <a:ext cx="5148372" cy="3477875"/>
           </a:xfrm>
           <a:prstGeom prst="rect">
@@ -21096,7 +21013,10 @@
           <a:lstStyle/>
           <a:p>
             <a:pPr algn="ctr"/>
-            <a:endParaRPr lang="en-US"/>
+            <a:endParaRPr lang="en-US">
+              <a:latin typeface="Arial" panose="020B0604020202020204" pitchFamily="34" charset="0"/>
+              <a:cs typeface="Arial" panose="020B0604020202020204" pitchFamily="34" charset="0"/>
+            </a:endParaRPr>
           </a:p>
         </p:txBody>
       </p:sp>
@@ -21149,7 +21069,10 @@
           <a:lstStyle/>
           <a:p>
             <a:pPr algn="ctr"/>
-            <a:endParaRPr lang="en-US"/>
+            <a:endParaRPr lang="en-US">
+              <a:latin typeface="Arial" panose="020B0604020202020204" pitchFamily="34" charset="0"/>
+              <a:cs typeface="Arial" panose="020B0604020202020204" pitchFamily="34" charset="0"/>
+            </a:endParaRPr>
           </a:p>
         </p:txBody>
       </p:sp>
@@ -21201,7 +21124,10 @@
           <a:lstStyle/>
           <a:p>
             <a:pPr algn="ctr"/>
-            <a:endParaRPr lang="en-US"/>
+            <a:endParaRPr lang="en-US">
+              <a:latin typeface="Arial" panose="020B0604020202020204" pitchFamily="34" charset="0"/>
+              <a:cs typeface="Arial" panose="020B0604020202020204" pitchFamily="34" charset="0"/>
+            </a:endParaRPr>
           </a:p>
         </p:txBody>
       </p:sp>
@@ -21253,7 +21179,10 @@
           <a:lstStyle/>
           <a:p>
             <a:pPr algn="ctr"/>
-            <a:endParaRPr lang="en-US"/>
+            <a:endParaRPr lang="en-US">
+              <a:latin typeface="Arial" panose="020B0604020202020204" pitchFamily="34" charset="0"/>
+              <a:cs typeface="Arial" panose="020B0604020202020204" pitchFamily="34" charset="0"/>
+            </a:endParaRPr>
           </a:p>
         </p:txBody>
       </p:sp>
@@ -21305,7 +21234,10 @@
           <a:lstStyle/>
           <a:p>
             <a:pPr algn="ctr"/>
-            <a:endParaRPr lang="en-US"/>
+            <a:endParaRPr lang="en-US">
+              <a:latin typeface="Arial" panose="020B0604020202020204" pitchFamily="34" charset="0"/>
+              <a:cs typeface="Arial" panose="020B0604020202020204" pitchFamily="34" charset="0"/>
+            </a:endParaRPr>
           </a:p>
         </p:txBody>
       </p:sp>
@@ -21357,7 +21289,10 @@
           <a:lstStyle/>
           <a:p>
             <a:pPr algn="ctr"/>
-            <a:endParaRPr lang="en-US"/>
+            <a:endParaRPr lang="en-US">
+              <a:latin typeface="Arial" panose="020B0604020202020204" pitchFamily="34" charset="0"/>
+              <a:cs typeface="Arial" panose="020B0604020202020204" pitchFamily="34" charset="0"/>
+            </a:endParaRPr>
           </a:p>
         </p:txBody>
       </p:sp>
@@ -21409,7 +21344,10 @@
           <a:lstStyle/>
           <a:p>
             <a:pPr algn="ctr"/>
-            <a:endParaRPr lang="en-US"/>
+            <a:endParaRPr lang="en-US">
+              <a:latin typeface="Arial" panose="020B0604020202020204" pitchFamily="34" charset="0"/>
+              <a:cs typeface="Arial" panose="020B0604020202020204" pitchFamily="34" charset="0"/>
+            </a:endParaRPr>
           </a:p>
         </p:txBody>
       </p:sp>
@@ -21461,7 +21399,10 @@
           <a:lstStyle/>
           <a:p>
             <a:pPr algn="ctr"/>
-            <a:endParaRPr lang="en-US"/>
+            <a:endParaRPr lang="en-US">
+              <a:latin typeface="Arial" panose="020B0604020202020204" pitchFamily="34" charset="0"/>
+              <a:cs typeface="Arial" panose="020B0604020202020204" pitchFamily="34" charset="0"/>
+            </a:endParaRPr>
           </a:p>
         </p:txBody>
       </p:sp>
@@ -21513,7 +21454,10 @@
           <a:lstStyle/>
           <a:p>
             <a:pPr algn="ctr"/>
-            <a:endParaRPr lang="en-US"/>
+            <a:endParaRPr lang="en-US">
+              <a:latin typeface="Arial" panose="020B0604020202020204" pitchFamily="34" charset="0"/>
+              <a:cs typeface="Arial" panose="020B0604020202020204" pitchFamily="34" charset="0"/>
+            </a:endParaRPr>
           </a:p>
         </p:txBody>
       </p:sp>
@@ -21565,7 +21509,10 @@
           <a:lstStyle/>
           <a:p>
             <a:pPr algn="ctr"/>
-            <a:endParaRPr lang="en-US"/>
+            <a:endParaRPr lang="en-US">
+              <a:latin typeface="Arial" panose="020B0604020202020204" pitchFamily="34" charset="0"/>
+              <a:cs typeface="Arial" panose="020B0604020202020204" pitchFamily="34" charset="0"/>
+            </a:endParaRPr>
           </a:p>
         </p:txBody>
       </p:sp>
@@ -21617,7 +21564,10 @@
           <a:lstStyle/>
           <a:p>
             <a:pPr algn="ctr"/>
-            <a:endParaRPr lang="en-US"/>
+            <a:endParaRPr lang="en-US">
+              <a:latin typeface="Arial" panose="020B0604020202020204" pitchFamily="34" charset="0"/>
+              <a:cs typeface="Arial" panose="020B0604020202020204" pitchFamily="34" charset="0"/>
+            </a:endParaRPr>
           </a:p>
         </p:txBody>
       </p:sp>
@@ -21635,8 +21585,8 @@
         </p:nvSpPr>
         <p:spPr>
           <a:xfrm>
-            <a:off x="264597" y="247765"/>
-            <a:ext cx="4599013" cy="919287"/>
+            <a:off x="297514" y="390235"/>
+            <a:ext cx="5178128" cy="919287"/>
           </a:xfrm>
           <a:prstGeom prst="rect">
             <a:avLst/>
@@ -21675,18 +21625,22 @@
           <a:p>
             <a:pPr algn="ctr"/>
             <a:r>
-              <a:rPr lang="en-US" sz="2400" b="1" dirty="0" err="1">
+              <a:rPr lang="en-US" b="1" dirty="0" err="1">
                 <a:solidFill>
                   <a:schemeClr val="tx1"/>
                 </a:solidFill>
+                <a:latin typeface="Arial" panose="020B0604020202020204" pitchFamily="34" charset="0"/>
+                <a:cs typeface="Arial" panose="020B0604020202020204" pitchFamily="34" charset="0"/>
               </a:rPr>
               <a:t>FunctionArchitecture</a:t>
             </a:r>
             <a:r>
-              <a:rPr lang="en-US" sz="2400" b="1" dirty="0">
+              <a:rPr lang="en-US" b="1" dirty="0">
                 <a:solidFill>
                   <a:schemeClr val="tx1"/>
                 </a:solidFill>
+                <a:latin typeface="Arial" panose="020B0604020202020204" pitchFamily="34" charset="0"/>
+                <a:cs typeface="Arial" panose="020B0604020202020204" pitchFamily="34" charset="0"/>
               </a:rPr>
               <a:t>: </a:t>
             </a:r>
@@ -21695,14 +21649,11 @@
                 <a:solidFill>
                   <a:schemeClr val="tx1"/>
                 </a:solidFill>
-              </a:rPr>
-              <a:t>Agglomeration of Functions, Flows, and Hazard Metrics</a:t>
-            </a:r>
-            <a:endParaRPr lang="en-US" sz="3200" dirty="0">
-              <a:solidFill>
-                <a:schemeClr val="tx1"/>
-              </a:solidFill>
-            </a:endParaRPr>
+                <a:latin typeface="Arial" panose="020B0604020202020204" pitchFamily="34" charset="0"/>
+                <a:cs typeface="Arial" panose="020B0604020202020204" pitchFamily="34" charset="0"/>
+              </a:rPr>
+              <a:t>Agglomeration of Functions, Flows, and Hazard Metrics in overall graph structure</a:t>
+            </a:r>
           </a:p>
         </p:txBody>
       </p:sp>
@@ -21722,9 +21673,9 @@
           <p:nvPr/>
         </p:nvCxnSpPr>
         <p:spPr>
-          <a:xfrm>
-            <a:off x="4863610" y="707409"/>
-            <a:ext cx="1024264" cy="22919"/>
+          <a:xfrm flipV="1">
+            <a:off x="5475642" y="849878"/>
+            <a:ext cx="388741" cy="1"/>
           </a:xfrm>
           <a:prstGeom prst="straightConnector1">
             <a:avLst/>
@@ -21767,8 +21718,8 @@
         </p:nvCxnSpPr>
         <p:spPr>
           <a:xfrm>
-            <a:off x="2903484" y="1205901"/>
-            <a:ext cx="0" cy="403241"/>
+            <a:off x="2903484" y="1309522"/>
+            <a:ext cx="0" cy="299620"/>
           </a:xfrm>
           <a:prstGeom prst="straightConnector1">
             <a:avLst/>
@@ -21809,8 +21760,8 @@
         </p:nvSpPr>
         <p:spPr>
           <a:xfrm>
-            <a:off x="152214" y="5866730"/>
-            <a:ext cx="3761056" cy="852801"/>
+            <a:off x="-1" y="5241889"/>
+            <a:ext cx="3379264" cy="889371"/>
           </a:xfrm>
           <a:prstGeom prst="rect">
             <a:avLst/>
@@ -21849,81 +21800,28 @@
           <a:p>
             <a:pPr algn="ctr"/>
             <a:r>
-              <a:rPr lang="en-US" sz="2400" b="1" dirty="0">
+              <a:rPr lang="en-US" sz="1600" b="1" dirty="0">
                 <a:solidFill>
                   <a:schemeClr val="tx1"/>
                 </a:solidFill>
+                <a:latin typeface="Arial" panose="020B0604020202020204" pitchFamily="34" charset="0"/>
+                <a:cs typeface="Arial" panose="020B0604020202020204" pitchFamily="34" charset="0"/>
               </a:rPr>
               <a:t>Component: </a:t>
             </a:r>
             <a:r>
-              <a:rPr lang="en-US" dirty="0">
+              <a:rPr lang="en-US" sz="1600" dirty="0">
                 <a:solidFill>
                   <a:schemeClr val="tx1"/>
                 </a:solidFill>
-              </a:rPr>
-              <a:t>Sub-behavior internal to a Function with its own behaviors and properties, </a:t>
-            </a:r>
-            <a:r>
-              <a:rPr lang="en-US" dirty="0" err="1">
-                <a:solidFill>
-                  <a:schemeClr val="tx1"/>
-                </a:solidFill>
-              </a:rPr>
-              <a:t>etc</a:t>
-            </a:r>
-            <a:endParaRPr lang="en-US" sz="3200" dirty="0">
-              <a:solidFill>
-                <a:schemeClr val="tx1"/>
-              </a:solidFill>
-            </a:endParaRPr>
-          </a:p>
-        </p:txBody>
-      </p:sp>
-      <p:cxnSp>
-        <p:nvCxnSpPr>
-          <p:cNvPr id="38" name="Straight Arrow Connector 37">
-            <a:extLst>
-              <a:ext uri="{FF2B5EF4-FFF2-40B4-BE49-F238E27FC236}">
-                <a16:creationId xmlns:a16="http://schemas.microsoft.com/office/drawing/2014/main" id="{A636CE67-6B99-66D8-C11A-38D8120344DC}"/>
-              </a:ext>
-            </a:extLst>
-          </p:cNvPr>
-          <p:cNvCxnSpPr>
-            <a:cxnSpLocks/>
-          </p:cNvCxnSpPr>
-          <p:nvPr/>
-        </p:nvCxnSpPr>
-        <p:spPr>
-          <a:xfrm flipV="1">
-            <a:off x="3929356" y="6153034"/>
-            <a:ext cx="457781" cy="301755"/>
-          </a:xfrm>
-          <a:prstGeom prst="straightConnector1">
-            <a:avLst/>
-          </a:prstGeom>
-          <a:ln w="57150">
-            <a:solidFill>
-              <a:schemeClr val="accent4"/>
-            </a:solidFill>
-            <a:tailEnd type="triangle"/>
-          </a:ln>
-        </p:spPr>
-        <p:style>
-          <a:lnRef idx="1">
-            <a:schemeClr val="accent1"/>
-          </a:lnRef>
-          <a:fillRef idx="0">
-            <a:schemeClr val="accent1"/>
-          </a:fillRef>
-          <a:effectRef idx="0">
-            <a:schemeClr val="accent1"/>
-          </a:effectRef>
-          <a:fontRef idx="minor">
-            <a:schemeClr val="tx1"/>
-          </a:fontRef>
-        </p:style>
-      </p:cxnSp>
+                <a:latin typeface="Arial" panose="020B0604020202020204" pitchFamily="34" charset="0"/>
+                <a:cs typeface="Arial" panose="020B0604020202020204" pitchFamily="34" charset="0"/>
+              </a:rPr>
+              <a:t>Sub-behavior internal to a Function with its own behaviors and properties, etc.</a:t>
+            </a:r>
+          </a:p>
+        </p:txBody>
+      </p:sp>
       <p:cxnSp>
         <p:nvCxnSpPr>
           <p:cNvPr id="40" name="Straight Arrow Connector 39">
@@ -22073,7 +21971,7 @@
         <p:spPr>
           <a:xfrm flipH="1" flipV="1">
             <a:off x="7336373" y="2577498"/>
-            <a:ext cx="1180662" cy="2329913"/>
+            <a:ext cx="1316178" cy="2453691"/>
           </a:xfrm>
           <a:prstGeom prst="straightConnector1">
             <a:avLst/>
@@ -22114,8 +22012,8 @@
         </p:nvSpPr>
         <p:spPr>
           <a:xfrm>
-            <a:off x="8010286" y="4868622"/>
-            <a:ext cx="3917117" cy="919287"/>
+            <a:off x="7879976" y="5052961"/>
+            <a:ext cx="4238732" cy="603980"/>
           </a:xfrm>
           <a:prstGeom prst="rect">
             <a:avLst/>
@@ -22154,10 +22052,12 @@
           <a:p>
             <a:pPr algn="ctr"/>
             <a:r>
-              <a:rPr lang="en-US" sz="2400" b="1" dirty="0">
+              <a:rPr lang="en-US" b="1" dirty="0">
                 <a:solidFill>
                   <a:schemeClr val="tx1"/>
                 </a:solidFill>
+                <a:latin typeface="Arial" panose="020B0604020202020204" pitchFamily="34" charset="0"/>
+                <a:cs typeface="Arial" panose="020B0604020202020204" pitchFamily="34" charset="0"/>
               </a:rPr>
               <a:t>Flow: </a:t>
             </a:r>
@@ -22166,14 +22066,11 @@
                 <a:solidFill>
                   <a:schemeClr val="tx1"/>
                 </a:solidFill>
+                <a:latin typeface="Arial" panose="020B0604020202020204" pitchFamily="34" charset="0"/>
+                <a:cs typeface="Arial" panose="020B0604020202020204" pitchFamily="34" charset="0"/>
               </a:rPr>
               <a:t>Data Structures (inputs/outputs) that connect Functions</a:t>
             </a:r>
-            <a:endParaRPr lang="en-US" sz="3200" dirty="0">
-              <a:solidFill>
-                <a:schemeClr val="tx1"/>
-              </a:solidFill>
-            </a:endParaRPr>
           </a:p>
         </p:txBody>
       </p:sp>
@@ -22191,8 +22088,8 @@
         </p:nvSpPr>
         <p:spPr>
           <a:xfrm>
-            <a:off x="8357653" y="2431949"/>
-            <a:ext cx="3761055" cy="919287"/>
+            <a:off x="8212629" y="2431949"/>
+            <a:ext cx="3906079" cy="919287"/>
           </a:xfrm>
           <a:prstGeom prst="rect">
             <a:avLst/>
@@ -22231,10 +22128,12 @@
           <a:p>
             <a:pPr algn="ctr"/>
             <a:r>
-              <a:rPr lang="en-US" sz="2400" b="1" dirty="0">
+              <a:rPr lang="en-US" b="1" dirty="0">
                 <a:solidFill>
                   <a:schemeClr val="tx1"/>
                 </a:solidFill>
+                <a:latin typeface="Arial" panose="020B0604020202020204" pitchFamily="34" charset="0"/>
+                <a:cs typeface="Arial" panose="020B0604020202020204" pitchFamily="34" charset="0"/>
               </a:rPr>
               <a:t>Function: </a:t>
             </a:r>
@@ -22243,77 +22142,30 @@
                 <a:solidFill>
                   <a:schemeClr val="tx1"/>
                 </a:solidFill>
+                <a:latin typeface="Arial" panose="020B0604020202020204" pitchFamily="34" charset="0"/>
+                <a:cs typeface="Arial" panose="020B0604020202020204" pitchFamily="34" charset="0"/>
               </a:rPr>
               <a:t>Defines high-level system behaviors as well as failure modes and component architectures</a:t>
             </a:r>
-            <a:endParaRPr lang="en-US" sz="3200" dirty="0">
-              <a:solidFill>
-                <a:schemeClr val="tx1"/>
-              </a:solidFill>
-            </a:endParaRPr>
-          </a:p>
-        </p:txBody>
-      </p:sp>
-      <p:cxnSp>
-        <p:nvCxnSpPr>
-          <p:cNvPr id="54" name="Straight Arrow Connector 53">
-            <a:extLst>
-              <a:ext uri="{FF2B5EF4-FFF2-40B4-BE49-F238E27FC236}">
-                <a16:creationId xmlns:a16="http://schemas.microsoft.com/office/drawing/2014/main" id="{AE38B42A-AF1F-004F-9F96-F27057EF9D9F}"/>
-              </a:ext>
-            </a:extLst>
-          </p:cNvPr>
-          <p:cNvCxnSpPr>
-            <a:cxnSpLocks/>
-          </p:cNvCxnSpPr>
-          <p:nvPr/>
-        </p:nvCxnSpPr>
+          </a:p>
+        </p:txBody>
+      </p:sp>
+      <p:sp>
+        <p:nvSpPr>
+          <p:cNvPr id="53" name="Rectangle 52">
+            <a:extLst>
+              <a:ext uri="{FF2B5EF4-FFF2-40B4-BE49-F238E27FC236}">
+                <a16:creationId xmlns:a16="http://schemas.microsoft.com/office/drawing/2014/main" id="{B3BED53B-69DC-458E-FB3B-BFA996A327B8}"/>
+              </a:ext>
+            </a:extLst>
+          </p:cNvPr>
+          <p:cNvSpPr/>
+          <p:nvPr/>
+        </p:nvSpPr>
         <p:spPr>
           <a:xfrm>
-            <a:off x="3032218" y="5427944"/>
-            <a:ext cx="441032" cy="1934"/>
-          </a:xfrm>
-          <a:prstGeom prst="straightConnector1">
-            <a:avLst/>
-          </a:prstGeom>
-          <a:ln w="57150">
-            <a:solidFill>
-              <a:srgbClr val="7030A0"/>
-            </a:solidFill>
-            <a:tailEnd type="triangle"/>
-          </a:ln>
-        </p:spPr>
-        <p:style>
-          <a:lnRef idx="1">
-            <a:schemeClr val="accent1"/>
-          </a:lnRef>
-          <a:fillRef idx="0">
-            <a:schemeClr val="accent1"/>
-          </a:fillRef>
-          <a:effectRef idx="0">
-            <a:schemeClr val="accent1"/>
-          </a:effectRef>
-          <a:fontRef idx="minor">
-            <a:schemeClr val="tx1"/>
-          </a:fontRef>
-        </p:style>
-      </p:cxnSp>
-      <p:sp>
-        <p:nvSpPr>
-          <p:cNvPr id="53" name="Rectangle 52">
-            <a:extLst>
-              <a:ext uri="{FF2B5EF4-FFF2-40B4-BE49-F238E27FC236}">
-                <a16:creationId xmlns:a16="http://schemas.microsoft.com/office/drawing/2014/main" id="{B3BED53B-69DC-458E-FB3B-BFA996A327B8}"/>
-              </a:ext>
-            </a:extLst>
-          </p:cNvPr>
-          <p:cNvSpPr/>
-          <p:nvPr/>
-        </p:nvSpPr>
-        <p:spPr>
-          <a:xfrm>
-            <a:off x="264597" y="5018313"/>
-            <a:ext cx="2898547" cy="769596"/>
+            <a:off x="60759" y="4563741"/>
+            <a:ext cx="2898547" cy="625753"/>
           </a:xfrm>
           <a:prstGeom prst="rect">
             <a:avLst/>
@@ -22349,10 +22201,12 @@
           <a:p>
             <a:pPr algn="ctr"/>
             <a:r>
-              <a:rPr lang="en-US" sz="2400" b="1" dirty="0">
+              <a:rPr lang="en-US" b="1" dirty="0">
                 <a:solidFill>
                   <a:schemeClr val="tx1"/>
                 </a:solidFill>
+                <a:latin typeface="Arial" panose="020B0604020202020204" pitchFamily="34" charset="0"/>
+                <a:cs typeface="Arial" panose="020B0604020202020204" pitchFamily="34" charset="0"/>
               </a:rPr>
               <a:t>State: </a:t>
             </a:r>
@@ -22361,14 +22215,11 @@
                 <a:solidFill>
                   <a:schemeClr val="tx1"/>
                 </a:solidFill>
+                <a:latin typeface="Arial" panose="020B0604020202020204" pitchFamily="34" charset="0"/>
+                <a:cs typeface="Arial" panose="020B0604020202020204" pitchFamily="34" charset="0"/>
               </a:rPr>
               <a:t>Entries that define Function/Flow state  </a:t>
             </a:r>
-            <a:endParaRPr lang="en-US" sz="3200" dirty="0">
-              <a:solidFill>
-                <a:schemeClr val="tx1"/>
-              </a:solidFill>
-            </a:endParaRPr>
           </a:p>
         </p:txBody>
       </p:sp>
@@ -22420,7 +22271,10 @@
           <a:lstStyle/>
           <a:p>
             <a:pPr algn="ctr"/>
-            <a:endParaRPr lang="en-US"/>
+            <a:endParaRPr lang="en-US">
+              <a:latin typeface="Arial" panose="020B0604020202020204" pitchFamily="34" charset="0"/>
+              <a:cs typeface="Arial" panose="020B0604020202020204" pitchFamily="34" charset="0"/>
+            </a:endParaRPr>
           </a:p>
         </p:txBody>
       </p:sp>
@@ -22472,10 +22326,102 @@
           <a:lstStyle/>
           <a:p>
             <a:pPr algn="ctr"/>
-            <a:endParaRPr lang="en-US"/>
-          </a:p>
-        </p:txBody>
-      </p:sp>
+            <a:endParaRPr lang="en-US">
+              <a:latin typeface="Arial" panose="020B0604020202020204" pitchFamily="34" charset="0"/>
+              <a:cs typeface="Arial" panose="020B0604020202020204" pitchFamily="34" charset="0"/>
+            </a:endParaRPr>
+          </a:p>
+        </p:txBody>
+      </p:sp>
+      <p:cxnSp>
+        <p:nvCxnSpPr>
+          <p:cNvPr id="54" name="Straight Arrow Connector 53">
+            <a:extLst>
+              <a:ext uri="{FF2B5EF4-FFF2-40B4-BE49-F238E27FC236}">
+                <a16:creationId xmlns:a16="http://schemas.microsoft.com/office/drawing/2014/main" id="{AE38B42A-AF1F-004F-9F96-F27057EF9D9F}"/>
+              </a:ext>
+            </a:extLst>
+          </p:cNvPr>
+          <p:cNvCxnSpPr>
+            <a:cxnSpLocks/>
+            <a:stCxn id="53" idx="3"/>
+          </p:cNvCxnSpPr>
+          <p:nvPr/>
+        </p:nvCxnSpPr>
+        <p:spPr>
+          <a:xfrm>
+            <a:off x="2959306" y="4876618"/>
+            <a:ext cx="480990" cy="254140"/>
+          </a:xfrm>
+          <a:prstGeom prst="straightConnector1">
+            <a:avLst/>
+          </a:prstGeom>
+          <a:ln w="57150">
+            <a:solidFill>
+              <a:srgbClr val="7030A0"/>
+            </a:solidFill>
+            <a:tailEnd type="triangle"/>
+          </a:ln>
+        </p:spPr>
+        <p:style>
+          <a:lnRef idx="1">
+            <a:schemeClr val="accent1"/>
+          </a:lnRef>
+          <a:fillRef idx="0">
+            <a:schemeClr val="accent1"/>
+          </a:fillRef>
+          <a:effectRef idx="0">
+            <a:schemeClr val="accent1"/>
+          </a:effectRef>
+          <a:fontRef idx="minor">
+            <a:schemeClr val="tx1"/>
+          </a:fontRef>
+        </p:style>
+      </p:cxnSp>
+      <p:cxnSp>
+        <p:nvCxnSpPr>
+          <p:cNvPr id="38" name="Straight Arrow Connector 37">
+            <a:extLst>
+              <a:ext uri="{FF2B5EF4-FFF2-40B4-BE49-F238E27FC236}">
+                <a16:creationId xmlns:a16="http://schemas.microsoft.com/office/drawing/2014/main" id="{A636CE67-6B99-66D8-C11A-38D8120344DC}"/>
+              </a:ext>
+            </a:extLst>
+          </p:cNvPr>
+          <p:cNvCxnSpPr>
+            <a:cxnSpLocks/>
+          </p:cNvCxnSpPr>
+          <p:nvPr/>
+        </p:nvCxnSpPr>
+        <p:spPr>
+          <a:xfrm>
+            <a:off x="3379263" y="5803055"/>
+            <a:ext cx="1003272" cy="0"/>
+          </a:xfrm>
+          <a:prstGeom prst="straightConnector1">
+            <a:avLst/>
+          </a:prstGeom>
+          <a:ln w="57150">
+            <a:solidFill>
+              <a:schemeClr val="accent4"/>
+            </a:solidFill>
+            <a:tailEnd type="triangle"/>
+          </a:ln>
+        </p:spPr>
+        <p:style>
+          <a:lnRef idx="1">
+            <a:schemeClr val="accent1"/>
+          </a:lnRef>
+          <a:fillRef idx="0">
+            <a:schemeClr val="accent1"/>
+          </a:fillRef>
+          <a:effectRef idx="0">
+            <a:schemeClr val="accent1"/>
+          </a:effectRef>
+          <a:fontRef idx="minor">
+            <a:schemeClr val="tx1"/>
+          </a:fontRef>
+        </p:style>
+      </p:cxnSp>
     </p:spTree>
     <p:extLst>
       <p:ext uri="{BB962C8B-B14F-4D97-AF65-F5344CB8AC3E}">
@@ -23405,7 +23351,7 @@
           <a:p>
             <a:fld id="{5B2B2ECE-C27A-4FBC-A5B7-24ADD502157D}" type="datetime1">
               <a:rPr lang="en-US" smtClean="0"/>
-              <a:t>12/11/2024</a:t>
+              <a:t>6/10/2025</a:t>
             </a:fld>
             <a:endParaRPr lang="en-US"/>
           </a:p>
@@ -23625,7 +23571,7 @@
           <a:p>
             <a:fld id="{C8D67213-7DC7-4566-B4E8-39CBEF03CE40}" type="datetime1">
               <a:rPr lang="en-US" smtClean="0"/>
-              <a:t>12/11/2024</a:t>
+              <a:t>6/10/2025</a:t>
             </a:fld>
             <a:endParaRPr lang="en-US"/>
           </a:p>
@@ -23952,7 +23898,7 @@
           <a:p>
             <a:fld id="{7DBF9849-58D3-4F19-9398-5C19541DD8B5}" type="datetime1">
               <a:rPr lang="en-US" smtClean="0"/>
-              <a:t>12/11/2024</a:t>
+              <a:t>6/10/2025</a:t>
             </a:fld>
             <a:endParaRPr lang="en-US"/>
           </a:p>
@@ -25340,7 +25286,7 @@
           <a:p>
             <a:fld id="{97B5B71A-C210-4A41-9D4A-E72BF6E30274}" type="datetime1">
               <a:rPr lang="en-US" smtClean="0"/>
-              <a:t>12/11/2024</a:t>
+              <a:t>6/10/2025</a:t>
             </a:fld>
             <a:endParaRPr lang="en-US"/>
           </a:p>
@@ -25979,12 +25925,6 @@
 </file>
 
 <file path=customXml/item1.xml><?xml version="1.0" encoding="utf-8"?>
-<p:properties xmlns:p="http://schemas.microsoft.com/office/2006/metadata/properties" xmlns:xsi="http://www.w3.org/2001/XMLSchema-instance" xmlns:pc="http://schemas.microsoft.com/office/infopath/2007/PartnerControls">
-  <documentManagement/>
-</p:properties>
-</file>
-
-<file path=customXml/item2.xml><?xml version="1.0" encoding="utf-8"?>
 <ct:contentTypeSchema xmlns:ct="http://schemas.microsoft.com/office/2006/metadata/contentType" xmlns:ma="http://schemas.microsoft.com/office/2006/metadata/properties/metaAttributes" ct:_="" ma:_="" ma:contentTypeName="Document" ma:contentTypeID="0x0101002F0B4413AAFFE34B9A5E0B87EBB2BF4F" ma:contentTypeVersion="0" ma:contentTypeDescription="Create a new document." ma:contentTypeScope="" ma:versionID="9632435baf965c6c093711282b9a8698">
   <xsd:schema xmlns:xsd="http://www.w3.org/2001/XMLSchema" xmlns:xs="http://www.w3.org/2001/XMLSchema" xmlns:p="http://schemas.microsoft.com/office/2006/metadata/properties" targetNamespace="http://schemas.microsoft.com/office/2006/metadata/properties" ma:root="true" ma:fieldsID="ad47a0f10127d9e30d85633090e6731d">
     <xsd:element name="properties">
@@ -26098,6 +26038,12 @@
 </ct:contentTypeSchema>
 </file>
 
+<file path=customXml/item2.xml><?xml version="1.0" encoding="utf-8"?>
+<p:properties xmlns:p="http://schemas.microsoft.com/office/2006/metadata/properties" xmlns:xsi="http://www.w3.org/2001/XMLSchema-instance" xmlns:pc="http://schemas.microsoft.com/office/infopath/2007/PartnerControls">
+  <documentManagement/>
+</p:properties>
+</file>
+
 <file path=customXml/item3.xml><?xml version="1.0" encoding="utf-8"?>
 <?mso-contentType ?>
 <FormTemplates xmlns="http://schemas.microsoft.com/sharepoint/v3/contenttype/forms">
@@ -26108,21 +26054,6 @@
 </file>
 
 <file path=customXml/itemProps1.xml><?xml version="1.0" encoding="utf-8"?>
-<ds:datastoreItem xmlns:ds="http://schemas.openxmlformats.org/officeDocument/2006/customXml" ds:itemID="{92B7266E-DF44-460A-A16F-F5ABEAF9A56A}">
-  <ds:schemaRefs>
-    <ds:schemaRef ds:uri="http://schemas.microsoft.com/office/2006/metadata/properties"/>
-    <ds:schemaRef ds:uri="http://purl.org/dc/terms/"/>
-    <ds:schemaRef ds:uri="http://schemas.openxmlformats.org/package/2006/metadata/core-properties"/>
-    <ds:schemaRef ds:uri="http://purl.org/dc/dcmitype/"/>
-    <ds:schemaRef ds:uri="http://schemas.microsoft.com/office/infopath/2007/PartnerControls"/>
-    <ds:schemaRef ds:uri="http://schemas.microsoft.com/office/2006/documentManagement/types"/>
-    <ds:schemaRef ds:uri="http://purl.org/dc/elements/1.1/"/>
-    <ds:schemaRef ds:uri="http://www.w3.org/XML/1998/namespace"/>
-  </ds:schemaRefs>
-</ds:datastoreItem>
-</file>
-
-<file path=customXml/itemProps2.xml><?xml version="1.0" encoding="utf-8"?>
 <ds:datastoreItem xmlns:ds="http://schemas.openxmlformats.org/officeDocument/2006/customXml" ds:itemID="{8807AEC1-3868-4489-99AA-F6101CBA6951}">
   <ds:schemaRefs>
     <ds:schemaRef ds:uri="http://schemas.microsoft.com/office/2006/metadata/contentType"/>
@@ -26138,6 +26069,21 @@
 </ds:datastoreItem>
 </file>
 
+<file path=customXml/itemProps2.xml><?xml version="1.0" encoding="utf-8"?>
+<ds:datastoreItem xmlns:ds="http://schemas.openxmlformats.org/officeDocument/2006/customXml" ds:itemID="{92B7266E-DF44-460A-A16F-F5ABEAF9A56A}">
+  <ds:schemaRefs>
+    <ds:schemaRef ds:uri="http://schemas.microsoft.com/office/2006/metadata/properties"/>
+    <ds:schemaRef ds:uri="http://purl.org/dc/terms/"/>
+    <ds:schemaRef ds:uri="http://schemas.openxmlformats.org/package/2006/metadata/core-properties"/>
+    <ds:schemaRef ds:uri="http://purl.org/dc/dcmitype/"/>
+    <ds:schemaRef ds:uri="http://schemas.microsoft.com/office/infopath/2007/PartnerControls"/>
+    <ds:schemaRef ds:uri="http://schemas.microsoft.com/office/2006/documentManagement/types"/>
+    <ds:schemaRef ds:uri="http://purl.org/dc/elements/1.1/"/>
+    <ds:schemaRef ds:uri="http://www.w3.org/XML/1998/namespace"/>
+  </ds:schemaRefs>
+</ds:datastoreItem>
+</file>
+
 <file path=customXml/itemProps3.xml><?xml version="1.0" encoding="utf-8"?>
 <ds:datastoreItem xmlns:ds="http://schemas.openxmlformats.org/officeDocument/2006/customXml" ds:itemID="{D3728C9A-7C9B-4A99-A7F5-4857043C7DB3}">
   <ds:schemaRefs>

</xml_diff>

<commit_message>
Time attribute now replaces time argument as simulation driver
- Removed time argument to static_behavior/dynamic_behavior everywhere
- Simulable.__call__ now simulates up to a time, making multiple-timestep simulations easier (and, in the future, multiple histories)
- init_time_hist moved into model instantiation
- Removed confusing history shifting, now models use their own t_ind to log at the end of the time-step
- Update of examples and tests to match (preliminary)
- see: RAD-522
</commit_message>
<xml_diff>
--- a/docs-source/figures/powerpoint/powerpoint_figures.pptx
+++ b/docs-source/figures/powerpoint/powerpoint_figures.pptx
@@ -212,7 +212,7 @@
           <a:p>
             <a:fld id="{711A52A6-9D8E-41FC-9651-78B3E515F872}" type="datetimeFigureOut">
               <a:rPr lang="en-US" smtClean="0"/>
-              <a:t>6/10/2025</a:t>
+              <a:t>8/5/2025</a:t>
             </a:fld>
             <a:endParaRPr lang="en-US"/>
           </a:p>
@@ -639,7 +639,7 @@
           <a:p>
             <a:fld id="{77F775AD-3704-4F98-A581-F4E052B5E341}" type="datetime1">
               <a:rPr lang="en-US" smtClean="0"/>
-              <a:t>6/10/2025</a:t>
+              <a:t>8/5/2025</a:t>
             </a:fld>
             <a:endParaRPr lang="en-US" dirty="0"/>
           </a:p>
@@ -888,7 +888,7 @@
           <a:p>
             <a:fld id="{B49B97F0-8049-4B63-9B9F-B08800B08AEA}" type="datetime1">
               <a:rPr lang="en-US" smtClean="0"/>
-              <a:t>6/10/2025</a:t>
+              <a:t>8/5/2025</a:t>
             </a:fld>
             <a:endParaRPr lang="en-US"/>
           </a:p>
@@ -1128,7 +1128,7 @@
           <a:p>
             <a:fld id="{76BB3555-78C2-4894-951A-9F28C24107FA}" type="datetime1">
               <a:rPr lang="en-US" smtClean="0"/>
-              <a:t>6/10/2025</a:t>
+              <a:t>8/5/2025</a:t>
             </a:fld>
             <a:endParaRPr lang="en-US"/>
           </a:p>
@@ -1358,7 +1358,7 @@
           <a:p>
             <a:fld id="{37A4B9B3-CD86-4259-A27A-F9B9C6081119}" type="datetime1">
               <a:rPr lang="en-US" smtClean="0"/>
-              <a:t>6/10/2025</a:t>
+              <a:t>8/5/2025</a:t>
             </a:fld>
             <a:endParaRPr lang="en-US"/>
           </a:p>
@@ -1636,7 +1636,7 @@
           <a:p>
             <a:fld id="{66287512-E62E-4968-99B9-D028D358C1D6}" type="datetime1">
               <a:rPr lang="en-US" smtClean="0"/>
-              <a:t>6/10/2025</a:t>
+              <a:t>8/5/2025</a:t>
             </a:fld>
             <a:endParaRPr lang="en-US"/>
           </a:p>
@@ -1959,7 +1959,7 @@
           <a:p>
             <a:fld id="{356AD7E7-9EE9-4D28-82A7-0AE338FFEED9}" type="datetime1">
               <a:rPr lang="en-US" smtClean="0"/>
-              <a:t>6/10/2025</a:t>
+              <a:t>8/5/2025</a:t>
             </a:fld>
             <a:endParaRPr lang="en-US"/>
           </a:p>
@@ -2433,7 +2433,7 @@
           <a:p>
             <a:fld id="{0B5CD5E0-6150-412F-8881-52709F06EC3B}" type="datetime1">
               <a:rPr lang="en-US" smtClean="0"/>
-              <a:t>6/10/2025</a:t>
+              <a:t>8/5/2025</a:t>
             </a:fld>
             <a:endParaRPr lang="en-US"/>
           </a:p>
@@ -2580,7 +2580,7 @@
           <a:p>
             <a:fld id="{9428AFA3-5281-4B53-8B8B-8FD665A2F0D7}" type="datetime1">
               <a:rPr lang="en-US" smtClean="0"/>
-              <a:t>6/10/2025</a:t>
+              <a:t>8/5/2025</a:t>
             </a:fld>
             <a:endParaRPr lang="en-US"/>
           </a:p>
@@ -2693,7 +2693,7 @@
           <a:p>
             <a:fld id="{556D1394-26AC-45DA-9E25-AB3CC25C7422}" type="datetime1">
               <a:rPr lang="en-US" smtClean="0"/>
-              <a:t>6/10/2025</a:t>
+              <a:t>8/5/2025</a:t>
             </a:fld>
             <a:endParaRPr lang="en-US"/>
           </a:p>
@@ -3018,7 +3018,7 @@
           <a:p>
             <a:fld id="{B641D803-18D9-4B72-95D8-021B736F630F}" type="datetime1">
               <a:rPr lang="en-US" smtClean="0"/>
-              <a:t>6/10/2025</a:t>
+              <a:t>8/5/2025</a:t>
             </a:fld>
             <a:endParaRPr lang="en-US"/>
           </a:p>
@@ -3310,7 +3310,7 @@
           <a:p>
             <a:fld id="{9F82DFCB-4787-4629-B4F0-DCD676BE203A}" type="datetime1">
               <a:rPr lang="en-US" smtClean="0"/>
-              <a:t>6/10/2025</a:t>
+              <a:t>8/5/2025</a:t>
             </a:fld>
             <a:endParaRPr lang="en-US"/>
           </a:p>
@@ -3550,7 +3550,7 @@
           <a:p>
             <a:fld id="{300C2ECC-D91C-40D5-A01C-469FC90F0645}" type="datetime1">
               <a:rPr lang="en-US" smtClean="0"/>
-              <a:t>6/10/2025</a:t>
+              <a:t>8/5/2025</a:t>
             </a:fld>
             <a:endParaRPr lang="en-US" dirty="0"/>
           </a:p>
@@ -10264,7 +10264,7 @@
             </a:r>
             <a:r>
               <a:rPr lang="en-US" sz="1600" dirty="0"/>
-              <a:t>(self, time):</a:t>
+              <a:t>(self):</a:t>
             </a:r>
           </a:p>
           <a:p>
@@ -13060,7 +13060,7 @@
             </a:r>
             <a:r>
               <a:rPr lang="en-US" sz="1600" dirty="0"/>
-              <a:t>(self, time):</a:t>
+              <a:t>(self):</a:t>
             </a:r>
           </a:p>
           <a:p>
@@ -13088,7 +13088,7 @@
             </a:r>
             <a:r>
               <a:rPr lang="en-US" sz="1600" dirty="0"/>
-              <a:t>(self, time):</a:t>
+              <a:t>(self):</a:t>
             </a:r>
           </a:p>
           <a:p>
@@ -13116,7 +13116,7 @@
             </a:r>
             <a:r>
               <a:rPr lang="en-US" sz="1600" dirty="0"/>
-              <a:t>(self, time):</a:t>
+              <a:t>(self):</a:t>
             </a:r>
           </a:p>
           <a:p>
@@ -13160,7 +13160,23 @@
             </a:r>
             <a:r>
               <a:rPr lang="en-US" sz="1600" dirty="0"/>
-              <a:t>(self, time):</a:t>
+              <a:t>(self, </a:t>
+            </a:r>
+            <a:r>
+              <a:rPr lang="en-US" sz="1600" dirty="0" err="1"/>
+              <a:t>scen</a:t>
+            </a:r>
+            <a:r>
+              <a:rPr lang="en-US" sz="1600" dirty="0"/>
+              <a:t>, </a:t>
+            </a:r>
+            <a:r>
+              <a:rPr lang="en-US" sz="1600" dirty="0" err="1"/>
+              <a:t>mdlhists</a:t>
+            </a:r>
+            <a:r>
+              <a:rPr lang="en-US" sz="1600" dirty="0"/>
+              <a:t>):</a:t>
             </a:r>
           </a:p>
           <a:p>
@@ -13798,7 +13814,7 @@
             </a:r>
             <a:r>
               <a:rPr lang="en-US" sz="1600" dirty="0"/>
-              <a:t>(self, time):</a:t>
+              <a:t>(self):</a:t>
             </a:r>
           </a:p>
           <a:p>
@@ -13904,7 +13920,23 @@
             </a:r>
             <a:r>
               <a:rPr lang="en-US" sz="1600" dirty="0"/>
-              <a:t>(self, time):</a:t>
+              <a:t>(self, </a:t>
+            </a:r>
+            <a:r>
+              <a:rPr lang="en-US" sz="1600" dirty="0" err="1"/>
+              <a:t>scen</a:t>
+            </a:r>
+            <a:r>
+              <a:rPr lang="en-US" sz="1600" dirty="0"/>
+              <a:t>, </a:t>
+            </a:r>
+            <a:r>
+              <a:rPr lang="en-US" sz="1600" dirty="0" err="1"/>
+              <a:t>mdlhists</a:t>
+            </a:r>
+            <a:r>
+              <a:rPr lang="en-US" sz="1600" dirty="0"/>
+              <a:t>):</a:t>
             </a:r>
           </a:p>
           <a:p>
@@ -23351,7 +23383,7 @@
           <a:p>
             <a:fld id="{5B2B2ECE-C27A-4FBC-A5B7-24ADD502157D}" type="datetime1">
               <a:rPr lang="en-US" smtClean="0"/>
-              <a:t>6/10/2025</a:t>
+              <a:t>8/5/2025</a:t>
             </a:fld>
             <a:endParaRPr lang="en-US"/>
           </a:p>
@@ -23571,7 +23603,7 @@
           <a:p>
             <a:fld id="{C8D67213-7DC7-4566-B4E8-39CBEF03CE40}" type="datetime1">
               <a:rPr lang="en-US" smtClean="0"/>
-              <a:t>6/10/2025</a:t>
+              <a:t>8/5/2025</a:t>
             </a:fld>
             <a:endParaRPr lang="en-US"/>
           </a:p>
@@ -23898,7 +23930,7 @@
           <a:p>
             <a:fld id="{7DBF9849-58D3-4F19-9398-5C19541DD8B5}" type="datetime1">
               <a:rPr lang="en-US" smtClean="0"/>
-              <a:t>6/10/2025</a:t>
+              <a:t>8/5/2025</a:t>
             </a:fld>
             <a:endParaRPr lang="en-US"/>
           </a:p>
@@ -25286,7 +25318,7 @@
           <a:p>
             <a:fld id="{97B5B71A-C210-4A41-9D4A-E72BF6E30274}" type="datetime1">
               <a:rPr lang="en-US" smtClean="0"/>
-              <a:t>6/10/2025</a:t>
+              <a:t>8/5/2025</a:t>
             </a:fld>
             <a:endParaRPr lang="en-US"/>
           </a:p>
@@ -25925,6 +25957,12 @@
 </file>
 
 <file path=customXml/item1.xml><?xml version="1.0" encoding="utf-8"?>
+<p:properties xmlns:p="http://schemas.microsoft.com/office/2006/metadata/properties" xmlns:xsi="http://www.w3.org/2001/XMLSchema-instance" xmlns:pc="http://schemas.microsoft.com/office/infopath/2007/PartnerControls">
+  <documentManagement/>
+</p:properties>
+</file>
+
+<file path=customXml/item2.xml><?xml version="1.0" encoding="utf-8"?>
 <ct:contentTypeSchema xmlns:ct="http://schemas.microsoft.com/office/2006/metadata/contentType" xmlns:ma="http://schemas.microsoft.com/office/2006/metadata/properties/metaAttributes" ct:_="" ma:_="" ma:contentTypeName="Document" ma:contentTypeID="0x0101002F0B4413AAFFE34B9A5E0B87EBB2BF4F" ma:contentTypeVersion="0" ma:contentTypeDescription="Create a new document." ma:contentTypeScope="" ma:versionID="9632435baf965c6c093711282b9a8698">
   <xsd:schema xmlns:xsd="http://www.w3.org/2001/XMLSchema" xmlns:xs="http://www.w3.org/2001/XMLSchema" xmlns:p="http://schemas.microsoft.com/office/2006/metadata/properties" targetNamespace="http://schemas.microsoft.com/office/2006/metadata/properties" ma:root="true" ma:fieldsID="ad47a0f10127d9e30d85633090e6731d">
     <xsd:element name="properties">
@@ -26038,12 +26076,6 @@
 </ct:contentTypeSchema>
 </file>
 
-<file path=customXml/item2.xml><?xml version="1.0" encoding="utf-8"?>
-<p:properties xmlns:p="http://schemas.microsoft.com/office/2006/metadata/properties" xmlns:xsi="http://www.w3.org/2001/XMLSchema-instance" xmlns:pc="http://schemas.microsoft.com/office/infopath/2007/PartnerControls">
-  <documentManagement/>
-</p:properties>
-</file>
-
 <file path=customXml/item3.xml><?xml version="1.0" encoding="utf-8"?>
 <?mso-contentType ?>
 <FormTemplates xmlns="http://schemas.microsoft.com/sharepoint/v3/contenttype/forms">
@@ -26054,6 +26086,21 @@
 </file>
 
 <file path=customXml/itemProps1.xml><?xml version="1.0" encoding="utf-8"?>
+<ds:datastoreItem xmlns:ds="http://schemas.openxmlformats.org/officeDocument/2006/customXml" ds:itemID="{92B7266E-DF44-460A-A16F-F5ABEAF9A56A}">
+  <ds:schemaRefs>
+    <ds:schemaRef ds:uri="http://schemas.microsoft.com/office/2006/metadata/properties"/>
+    <ds:schemaRef ds:uri="http://purl.org/dc/terms/"/>
+    <ds:schemaRef ds:uri="http://schemas.openxmlformats.org/package/2006/metadata/core-properties"/>
+    <ds:schemaRef ds:uri="http://purl.org/dc/dcmitype/"/>
+    <ds:schemaRef ds:uri="http://schemas.microsoft.com/office/infopath/2007/PartnerControls"/>
+    <ds:schemaRef ds:uri="http://schemas.microsoft.com/office/2006/documentManagement/types"/>
+    <ds:schemaRef ds:uri="http://purl.org/dc/elements/1.1/"/>
+    <ds:schemaRef ds:uri="http://www.w3.org/XML/1998/namespace"/>
+  </ds:schemaRefs>
+</ds:datastoreItem>
+</file>
+
+<file path=customXml/itemProps2.xml><?xml version="1.0" encoding="utf-8"?>
 <ds:datastoreItem xmlns:ds="http://schemas.openxmlformats.org/officeDocument/2006/customXml" ds:itemID="{8807AEC1-3868-4489-99AA-F6101CBA6951}">
   <ds:schemaRefs>
     <ds:schemaRef ds:uri="http://schemas.microsoft.com/office/2006/metadata/contentType"/>
@@ -26069,21 +26116,6 @@
 </ds:datastoreItem>
 </file>
 
-<file path=customXml/itemProps2.xml><?xml version="1.0" encoding="utf-8"?>
-<ds:datastoreItem xmlns:ds="http://schemas.openxmlformats.org/officeDocument/2006/customXml" ds:itemID="{92B7266E-DF44-460A-A16F-F5ABEAF9A56A}">
-  <ds:schemaRefs>
-    <ds:schemaRef ds:uri="http://schemas.microsoft.com/office/2006/metadata/properties"/>
-    <ds:schemaRef ds:uri="http://purl.org/dc/terms/"/>
-    <ds:schemaRef ds:uri="http://schemas.openxmlformats.org/package/2006/metadata/core-properties"/>
-    <ds:schemaRef ds:uri="http://purl.org/dc/dcmitype/"/>
-    <ds:schemaRef ds:uri="http://schemas.microsoft.com/office/infopath/2007/PartnerControls"/>
-    <ds:schemaRef ds:uri="http://schemas.microsoft.com/office/2006/documentManagement/types"/>
-    <ds:schemaRef ds:uri="http://purl.org/dc/elements/1.1/"/>
-    <ds:schemaRef ds:uri="http://www.w3.org/XML/1998/namespace"/>
-  </ds:schemaRefs>
-</ds:datastoreItem>
-</file>
-
 <file path=customXml/itemProps3.xml><?xml version="1.0" encoding="utf-8"?>
 <ds:datastoreItem xmlns:ds="http://schemas.openxmlformats.org/officeDocument/2006/customXml" ds:itemID="{D3728C9A-7C9B-4A99-A7F5-4857043C7DB3}">
   <ds:schemaRefs>

</xml_diff>